<commit_message>
added diagram for shared-reserved capacity
</commit_message>
<xml_diff>
--- a/docs/images/diagrams.pptx
+++ b/docs/images/diagrams.pptx
@@ -7,6 +7,7 @@
   <p:sldIdLst>
     <p:sldId id="256" r:id="rId2"/>
     <p:sldId id="257" r:id="rId3"/>
+    <p:sldId id="260" r:id="rId4"/>
   </p:sldIdLst>
   <p:sldSz cx="12192000" cy="6858000"/>
   <p:notesSz cx="6858000" cy="9144000"/>
@@ -105,6 +106,11 @@
       </a:defRPr>
     </a:lvl9pPr>
   </p:defaultTextStyle>
+  <p:extLst>
+    <p:ext uri="{EFAFB233-063F-42B5-8137-9DF3F51BA10A}">
+      <p15:sldGuideLst xmlns:p15="http://schemas.microsoft.com/office/powerpoint/2012/main"/>
+    </p:ext>
+  </p:extLst>
 </p:presentation>
 </file>
 
@@ -255,7 +261,7 @@
           <a:p>
             <a:fld id="{E1401BA4-237C-B44E-BFA4-C7505F294036}" type="datetimeFigureOut">
               <a:rPr lang="en-US" smtClean="0"/>
-              <a:t>12/16/20</a:t>
+              <a:t>4/8/2021</a:t>
             </a:fld>
             <a:endParaRPr lang="en-US"/>
           </a:p>
@@ -453,7 +459,7 @@
           <a:p>
             <a:fld id="{E1401BA4-237C-B44E-BFA4-C7505F294036}" type="datetimeFigureOut">
               <a:rPr lang="en-US" smtClean="0"/>
-              <a:t>12/16/20</a:t>
+              <a:t>4/8/2021</a:t>
             </a:fld>
             <a:endParaRPr lang="en-US"/>
           </a:p>
@@ -661,7 +667,7 @@
           <a:p>
             <a:fld id="{E1401BA4-237C-B44E-BFA4-C7505F294036}" type="datetimeFigureOut">
               <a:rPr lang="en-US" smtClean="0"/>
-              <a:t>12/16/20</a:t>
+              <a:t>4/8/2021</a:t>
             </a:fld>
             <a:endParaRPr lang="en-US"/>
           </a:p>
@@ -859,7 +865,7 @@
           <a:p>
             <a:fld id="{E1401BA4-237C-B44E-BFA4-C7505F294036}" type="datetimeFigureOut">
               <a:rPr lang="en-US" smtClean="0"/>
-              <a:t>12/16/20</a:t>
+              <a:t>4/8/2021</a:t>
             </a:fld>
             <a:endParaRPr lang="en-US"/>
           </a:p>
@@ -1134,7 +1140,7 @@
           <a:p>
             <a:fld id="{E1401BA4-237C-B44E-BFA4-C7505F294036}" type="datetimeFigureOut">
               <a:rPr lang="en-US" smtClean="0"/>
-              <a:t>12/16/20</a:t>
+              <a:t>4/8/2021</a:t>
             </a:fld>
             <a:endParaRPr lang="en-US"/>
           </a:p>
@@ -1399,7 +1405,7 @@
           <a:p>
             <a:fld id="{E1401BA4-237C-B44E-BFA4-C7505F294036}" type="datetimeFigureOut">
               <a:rPr lang="en-US" smtClean="0"/>
-              <a:t>12/16/20</a:t>
+              <a:t>4/8/2021</a:t>
             </a:fld>
             <a:endParaRPr lang="en-US"/>
           </a:p>
@@ -1811,7 +1817,7 @@
           <a:p>
             <a:fld id="{E1401BA4-237C-B44E-BFA4-C7505F294036}" type="datetimeFigureOut">
               <a:rPr lang="en-US" smtClean="0"/>
-              <a:t>12/16/20</a:t>
+              <a:t>4/8/2021</a:t>
             </a:fld>
             <a:endParaRPr lang="en-US"/>
           </a:p>
@@ -1952,7 +1958,7 @@
           <a:p>
             <a:fld id="{E1401BA4-237C-B44E-BFA4-C7505F294036}" type="datetimeFigureOut">
               <a:rPr lang="en-US" smtClean="0"/>
-              <a:t>12/16/20</a:t>
+              <a:t>4/8/2021</a:t>
             </a:fld>
             <a:endParaRPr lang="en-US"/>
           </a:p>
@@ -2065,7 +2071,7 @@
           <a:p>
             <a:fld id="{E1401BA4-237C-B44E-BFA4-C7505F294036}" type="datetimeFigureOut">
               <a:rPr lang="en-US" smtClean="0"/>
-              <a:t>12/16/20</a:t>
+              <a:t>4/8/2021</a:t>
             </a:fld>
             <a:endParaRPr lang="en-US"/>
           </a:p>
@@ -2376,7 +2382,7 @@
           <a:p>
             <a:fld id="{E1401BA4-237C-B44E-BFA4-C7505F294036}" type="datetimeFigureOut">
               <a:rPr lang="en-US" smtClean="0"/>
-              <a:t>12/16/20</a:t>
+              <a:t>4/8/2021</a:t>
             </a:fld>
             <a:endParaRPr lang="en-US"/>
           </a:p>
@@ -2664,7 +2670,7 @@
           <a:p>
             <a:fld id="{E1401BA4-237C-B44E-BFA4-C7505F294036}" type="datetimeFigureOut">
               <a:rPr lang="en-US" smtClean="0"/>
-              <a:t>12/16/20</a:t>
+              <a:t>4/8/2021</a:t>
             </a:fld>
             <a:endParaRPr lang="en-US"/>
           </a:p>
@@ -2905,7 +2911,7 @@
           <a:p>
             <a:fld id="{E1401BA4-237C-B44E-BFA4-C7505F294036}" type="datetimeFigureOut">
               <a:rPr lang="en-US" smtClean="0"/>
-              <a:t>12/16/20</a:t>
+              <a:t>4/8/2021</a:t>
             </a:fld>
             <a:endParaRPr lang="en-US"/>
           </a:p>
@@ -5437,6 +5443,3333 @@
 </p:sld>
 </file>
 
+<file path=ppt/slides/slide3.xml><?xml version="1.0" encoding="utf-8"?>
+<p:sld xmlns:a="http://schemas.openxmlformats.org/drawingml/2006/main" xmlns:r="http://schemas.openxmlformats.org/officeDocument/2006/relationships" xmlns:p="http://schemas.openxmlformats.org/presentationml/2006/main">
+  <p:cSld>
+    <p:spTree>
+      <p:nvGrpSpPr>
+        <p:cNvPr id="1" name=""/>
+        <p:cNvGrpSpPr/>
+        <p:nvPr/>
+      </p:nvGrpSpPr>
+      <p:grpSpPr>
+        <a:xfrm>
+          <a:off x="0" y="0"/>
+          <a:ext cx="0" cy="0"/>
+          <a:chOff x="0" y="0"/>
+          <a:chExt cx="0" cy="0"/>
+        </a:xfrm>
+      </p:grpSpPr>
+      <p:sp>
+        <p:nvSpPr>
+          <p:cNvPr id="59" name="Down Arrow 18">
+            <a:extLst>
+              <a:ext uri="{FF2B5EF4-FFF2-40B4-BE49-F238E27FC236}">
+                <a16:creationId xmlns:a16="http://schemas.microsoft.com/office/drawing/2014/main" id="{B209FF6A-1CB7-4F9F-BECE-E2B8F1C38E2D}"/>
+              </a:ext>
+            </a:extLst>
+          </p:cNvPr>
+          <p:cNvSpPr/>
+          <p:nvPr/>
+        </p:nvSpPr>
+        <p:spPr>
+          <a:xfrm rot="15300000">
+            <a:off x="6736094" y="1008853"/>
+            <a:ext cx="588579" cy="6639910"/>
+          </a:xfrm>
+          <a:prstGeom prst="downArrow">
+            <a:avLst/>
+          </a:prstGeom>
+          <a:solidFill>
+            <a:srgbClr val="92D050"/>
+          </a:solidFill>
+          <a:ln w="12700" cap="flat" cmpd="sng" algn="ctr">
+            <a:solidFill>
+              <a:srgbClr val="00B050"/>
+            </a:solidFill>
+            <a:prstDash val="solid"/>
+            <a:miter lim="800000"/>
+          </a:ln>
+          <a:effectLst/>
+        </p:spPr>
+        <p:txBody>
+          <a:bodyPr rtlCol="0" anchor="ctr"/>
+          <a:lstStyle/>
+          <a:p>
+            <a:pPr marL="0" marR="0" lvl="0" indent="0" algn="ctr" defTabSz="914400" eaLnBrk="1" fontAlgn="auto" latinLnBrk="0" hangingPunct="1">
+              <a:lnSpc>
+                <a:spcPct val="100000"/>
+              </a:lnSpc>
+              <a:spcBef>
+                <a:spcPts val="0"/>
+              </a:spcBef>
+              <a:spcAft>
+                <a:spcPts val="0"/>
+              </a:spcAft>
+              <a:buClrTx/>
+              <a:buSzTx/>
+              <a:buFontTx/>
+              <a:buNone/>
+              <a:tabLst/>
+              <a:defRPr/>
+            </a:pPr>
+            <a:endParaRPr kumimoji="0" lang="en-US" sz="1800" b="0" i="0" u="none" strike="noStrike" kern="0" cap="none" spc="0" normalizeH="0" baseline="0" noProof="0">
+              <a:ln>
+                <a:noFill/>
+              </a:ln>
+              <a:solidFill>
+                <a:srgbClr val="FFFFFF"/>
+              </a:solidFill>
+              <a:effectLst/>
+              <a:uLnTx/>
+              <a:uFillTx/>
+              <a:latin typeface="Open sans"/>
+              <a:ea typeface="+mn-ea"/>
+              <a:cs typeface="+mn-cs"/>
+            </a:endParaRPr>
+          </a:p>
+        </p:txBody>
+      </p:sp>
+      <p:cxnSp>
+        <p:nvCxnSpPr>
+          <p:cNvPr id="2" name="Straight Arrow Connector 1">
+            <a:extLst>
+              <a:ext uri="{FF2B5EF4-FFF2-40B4-BE49-F238E27FC236}">
+                <a16:creationId xmlns:a16="http://schemas.microsoft.com/office/drawing/2014/main" id="{33C001F5-2DFD-4188-993A-72E3F2FB693F}"/>
+              </a:ext>
+            </a:extLst>
+          </p:cNvPr>
+          <p:cNvCxnSpPr>
+            <a:cxnSpLocks/>
+            <a:stCxn id="23" idx="0"/>
+            <a:endCxn id="53" idx="2"/>
+          </p:cNvCxnSpPr>
+          <p:nvPr/>
+        </p:nvCxnSpPr>
+        <p:spPr>
+          <a:xfrm flipH="1" flipV="1">
+            <a:off x="640022" y="2990956"/>
+            <a:ext cx="2744309" cy="2337788"/>
+          </a:xfrm>
+          <a:prstGeom prst="straightConnector1">
+            <a:avLst/>
+          </a:prstGeom>
+          <a:noFill/>
+          <a:ln w="38100" cap="flat" cmpd="sng" algn="ctr">
+            <a:solidFill>
+              <a:srgbClr val="00B050"/>
+            </a:solidFill>
+            <a:prstDash val="solid"/>
+            <a:miter lim="800000"/>
+            <a:tailEnd type="triangle"/>
+          </a:ln>
+          <a:effectLst/>
+        </p:spPr>
+      </p:cxnSp>
+      <p:cxnSp>
+        <p:nvCxnSpPr>
+          <p:cNvPr id="3" name="Straight Arrow Connector 2">
+            <a:extLst>
+              <a:ext uri="{FF2B5EF4-FFF2-40B4-BE49-F238E27FC236}">
+                <a16:creationId xmlns:a16="http://schemas.microsoft.com/office/drawing/2014/main" id="{BCCFD4E6-F083-45D2-A433-33A66BDA2C3E}"/>
+              </a:ext>
+            </a:extLst>
+          </p:cNvPr>
+          <p:cNvCxnSpPr>
+            <a:cxnSpLocks/>
+            <a:stCxn id="23" idx="0"/>
+            <a:endCxn id="54" idx="2"/>
+          </p:cNvCxnSpPr>
+          <p:nvPr/>
+        </p:nvCxnSpPr>
+        <p:spPr>
+          <a:xfrm flipH="1" flipV="1">
+            <a:off x="975724" y="2990956"/>
+            <a:ext cx="2408607" cy="2337788"/>
+          </a:xfrm>
+          <a:prstGeom prst="straightConnector1">
+            <a:avLst/>
+          </a:prstGeom>
+          <a:noFill/>
+          <a:ln w="38100" cap="flat" cmpd="sng" algn="ctr">
+            <a:solidFill>
+              <a:srgbClr val="00B050"/>
+            </a:solidFill>
+            <a:prstDash val="solid"/>
+            <a:miter lim="800000"/>
+            <a:tailEnd type="triangle"/>
+          </a:ln>
+          <a:effectLst/>
+        </p:spPr>
+      </p:cxnSp>
+      <p:cxnSp>
+        <p:nvCxnSpPr>
+          <p:cNvPr id="4" name="Straight Arrow Connector 3">
+            <a:extLst>
+              <a:ext uri="{FF2B5EF4-FFF2-40B4-BE49-F238E27FC236}">
+                <a16:creationId xmlns:a16="http://schemas.microsoft.com/office/drawing/2014/main" id="{6CFCF6D1-4BA4-4162-9218-3625BFAB9253}"/>
+              </a:ext>
+            </a:extLst>
+          </p:cNvPr>
+          <p:cNvCxnSpPr>
+            <a:cxnSpLocks/>
+            <a:stCxn id="23" idx="0"/>
+            <a:endCxn id="50" idx="2"/>
+          </p:cNvCxnSpPr>
+          <p:nvPr/>
+        </p:nvCxnSpPr>
+        <p:spPr>
+          <a:xfrm flipH="1" flipV="1">
+            <a:off x="1304377" y="2995924"/>
+            <a:ext cx="2079954" cy="2332820"/>
+          </a:xfrm>
+          <a:prstGeom prst="straightConnector1">
+            <a:avLst/>
+          </a:prstGeom>
+          <a:noFill/>
+          <a:ln w="38100" cap="flat" cmpd="sng" algn="ctr">
+            <a:solidFill>
+              <a:srgbClr val="00B050"/>
+            </a:solidFill>
+            <a:prstDash val="solid"/>
+            <a:miter lim="800000"/>
+            <a:tailEnd type="triangle"/>
+          </a:ln>
+          <a:effectLst/>
+        </p:spPr>
+      </p:cxnSp>
+      <p:cxnSp>
+        <p:nvCxnSpPr>
+          <p:cNvPr id="5" name="Straight Arrow Connector 4">
+            <a:extLst>
+              <a:ext uri="{FF2B5EF4-FFF2-40B4-BE49-F238E27FC236}">
+                <a16:creationId xmlns:a16="http://schemas.microsoft.com/office/drawing/2014/main" id="{96852353-0519-4230-85A4-C7F8A34C7136}"/>
+              </a:ext>
+            </a:extLst>
+          </p:cNvPr>
+          <p:cNvCxnSpPr>
+            <a:cxnSpLocks/>
+            <a:stCxn id="23" idx="0"/>
+            <a:endCxn id="51" idx="2"/>
+          </p:cNvCxnSpPr>
+          <p:nvPr/>
+        </p:nvCxnSpPr>
+        <p:spPr>
+          <a:xfrm flipH="1" flipV="1">
+            <a:off x="1640079" y="2995924"/>
+            <a:ext cx="1744252" cy="2332820"/>
+          </a:xfrm>
+          <a:prstGeom prst="straightConnector1">
+            <a:avLst/>
+          </a:prstGeom>
+          <a:noFill/>
+          <a:ln w="38100" cap="flat" cmpd="sng" algn="ctr">
+            <a:solidFill>
+              <a:srgbClr val="00B050"/>
+            </a:solidFill>
+            <a:prstDash val="solid"/>
+            <a:miter lim="800000"/>
+            <a:tailEnd type="triangle"/>
+          </a:ln>
+          <a:effectLst/>
+        </p:spPr>
+      </p:cxnSp>
+      <p:cxnSp>
+        <p:nvCxnSpPr>
+          <p:cNvPr id="6" name="Straight Arrow Connector 5">
+            <a:extLst>
+              <a:ext uri="{FF2B5EF4-FFF2-40B4-BE49-F238E27FC236}">
+                <a16:creationId xmlns:a16="http://schemas.microsoft.com/office/drawing/2014/main" id="{04F4453F-0F3D-4F6C-9397-5A4E9B1B2DC6}"/>
+              </a:ext>
+            </a:extLst>
+          </p:cNvPr>
+          <p:cNvCxnSpPr>
+            <a:cxnSpLocks/>
+            <a:stCxn id="23" idx="0"/>
+            <a:endCxn id="52" idx="2"/>
+          </p:cNvCxnSpPr>
+          <p:nvPr/>
+        </p:nvCxnSpPr>
+        <p:spPr>
+          <a:xfrm flipH="1" flipV="1">
+            <a:off x="1975677" y="2998531"/>
+            <a:ext cx="1408654" cy="2330213"/>
+          </a:xfrm>
+          <a:prstGeom prst="straightConnector1">
+            <a:avLst/>
+          </a:prstGeom>
+          <a:noFill/>
+          <a:ln w="38100" cap="flat" cmpd="sng" algn="ctr">
+            <a:solidFill>
+              <a:srgbClr val="00B050"/>
+            </a:solidFill>
+            <a:prstDash val="solid"/>
+            <a:miter lim="800000"/>
+            <a:tailEnd type="triangle"/>
+          </a:ln>
+          <a:effectLst/>
+        </p:spPr>
+      </p:cxnSp>
+      <p:cxnSp>
+        <p:nvCxnSpPr>
+          <p:cNvPr id="7" name="Straight Arrow Connector 6">
+            <a:extLst>
+              <a:ext uri="{FF2B5EF4-FFF2-40B4-BE49-F238E27FC236}">
+                <a16:creationId xmlns:a16="http://schemas.microsoft.com/office/drawing/2014/main" id="{D8921286-DD20-4104-8C9F-4C21C1C86E02}"/>
+              </a:ext>
+            </a:extLst>
+          </p:cNvPr>
+          <p:cNvCxnSpPr>
+            <a:cxnSpLocks/>
+            <a:stCxn id="23" idx="0"/>
+            <a:endCxn id="49" idx="2"/>
+          </p:cNvCxnSpPr>
+          <p:nvPr/>
+        </p:nvCxnSpPr>
+        <p:spPr>
+          <a:xfrm flipH="1" flipV="1">
+            <a:off x="2307278" y="2998531"/>
+            <a:ext cx="1077053" cy="2330213"/>
+          </a:xfrm>
+          <a:prstGeom prst="straightConnector1">
+            <a:avLst/>
+          </a:prstGeom>
+          <a:noFill/>
+          <a:ln w="38100" cap="flat" cmpd="sng" algn="ctr">
+            <a:solidFill>
+              <a:srgbClr val="00B050"/>
+            </a:solidFill>
+            <a:prstDash val="solid"/>
+            <a:miter lim="800000"/>
+            <a:tailEnd type="triangle"/>
+          </a:ln>
+          <a:effectLst/>
+        </p:spPr>
+      </p:cxnSp>
+      <p:cxnSp>
+        <p:nvCxnSpPr>
+          <p:cNvPr id="8" name="Straight Arrow Connector 7">
+            <a:extLst>
+              <a:ext uri="{FF2B5EF4-FFF2-40B4-BE49-F238E27FC236}">
+                <a16:creationId xmlns:a16="http://schemas.microsoft.com/office/drawing/2014/main" id="{70140B6F-2D48-48BE-8977-220427061A0E}"/>
+              </a:ext>
+            </a:extLst>
+          </p:cNvPr>
+          <p:cNvCxnSpPr>
+            <a:cxnSpLocks/>
+            <a:stCxn id="23" idx="0"/>
+            <a:endCxn id="46" idx="2"/>
+          </p:cNvCxnSpPr>
+          <p:nvPr/>
+        </p:nvCxnSpPr>
+        <p:spPr>
+          <a:xfrm flipH="1" flipV="1">
+            <a:off x="2642980" y="2998531"/>
+            <a:ext cx="741351" cy="2330213"/>
+          </a:xfrm>
+          <a:prstGeom prst="straightConnector1">
+            <a:avLst/>
+          </a:prstGeom>
+          <a:noFill/>
+          <a:ln w="38100" cap="flat" cmpd="sng" algn="ctr">
+            <a:solidFill>
+              <a:srgbClr val="00B050"/>
+            </a:solidFill>
+            <a:prstDash val="solid"/>
+            <a:miter lim="800000"/>
+            <a:tailEnd type="triangle"/>
+          </a:ln>
+          <a:effectLst/>
+        </p:spPr>
+      </p:cxnSp>
+      <p:cxnSp>
+        <p:nvCxnSpPr>
+          <p:cNvPr id="9" name="Straight Arrow Connector 8">
+            <a:extLst>
+              <a:ext uri="{FF2B5EF4-FFF2-40B4-BE49-F238E27FC236}">
+                <a16:creationId xmlns:a16="http://schemas.microsoft.com/office/drawing/2014/main" id="{B122A61D-5061-4D62-B8AE-C5DDD8A17AAF}"/>
+              </a:ext>
+            </a:extLst>
+          </p:cNvPr>
+          <p:cNvCxnSpPr>
+            <a:cxnSpLocks/>
+            <a:stCxn id="23" idx="0"/>
+            <a:endCxn id="47" idx="2"/>
+          </p:cNvCxnSpPr>
+          <p:nvPr/>
+        </p:nvCxnSpPr>
+        <p:spPr>
+          <a:xfrm flipH="1" flipV="1">
+            <a:off x="2978681" y="2998531"/>
+            <a:ext cx="405650" cy="2330213"/>
+          </a:xfrm>
+          <a:prstGeom prst="straightConnector1">
+            <a:avLst/>
+          </a:prstGeom>
+          <a:noFill/>
+          <a:ln w="38100" cap="flat" cmpd="sng" algn="ctr">
+            <a:solidFill>
+              <a:srgbClr val="00B050"/>
+            </a:solidFill>
+            <a:prstDash val="solid"/>
+            <a:miter lim="800000"/>
+            <a:tailEnd type="triangle"/>
+          </a:ln>
+          <a:effectLst/>
+        </p:spPr>
+      </p:cxnSp>
+      <p:cxnSp>
+        <p:nvCxnSpPr>
+          <p:cNvPr id="10" name="Straight Arrow Connector 9">
+            <a:extLst>
+              <a:ext uri="{FF2B5EF4-FFF2-40B4-BE49-F238E27FC236}">
+                <a16:creationId xmlns:a16="http://schemas.microsoft.com/office/drawing/2014/main" id="{DB93C886-9A9E-4585-9DEA-9718758A62BA}"/>
+              </a:ext>
+            </a:extLst>
+          </p:cNvPr>
+          <p:cNvCxnSpPr>
+            <a:cxnSpLocks/>
+            <a:stCxn id="23" idx="0"/>
+            <a:endCxn id="48" idx="2"/>
+          </p:cNvCxnSpPr>
+          <p:nvPr/>
+        </p:nvCxnSpPr>
+        <p:spPr>
+          <a:xfrm flipH="1" flipV="1">
+            <a:off x="3314280" y="3001138"/>
+            <a:ext cx="70051" cy="2327606"/>
+          </a:xfrm>
+          <a:prstGeom prst="straightConnector1">
+            <a:avLst/>
+          </a:prstGeom>
+          <a:noFill/>
+          <a:ln w="38100" cap="flat" cmpd="sng" algn="ctr">
+            <a:solidFill>
+              <a:srgbClr val="00B050"/>
+            </a:solidFill>
+            <a:prstDash val="solid"/>
+            <a:miter lim="800000"/>
+            <a:tailEnd type="triangle"/>
+          </a:ln>
+          <a:effectLst/>
+        </p:spPr>
+      </p:cxnSp>
+      <p:cxnSp>
+        <p:nvCxnSpPr>
+          <p:cNvPr id="11" name="Straight Arrow Connector 10">
+            <a:extLst>
+              <a:ext uri="{FF2B5EF4-FFF2-40B4-BE49-F238E27FC236}">
+                <a16:creationId xmlns:a16="http://schemas.microsoft.com/office/drawing/2014/main" id="{DA395298-0BEC-4857-BF34-0EE429D72828}"/>
+              </a:ext>
+            </a:extLst>
+          </p:cNvPr>
+          <p:cNvCxnSpPr>
+            <a:cxnSpLocks/>
+            <a:stCxn id="23" idx="0"/>
+            <a:endCxn id="45" idx="2"/>
+          </p:cNvCxnSpPr>
+          <p:nvPr/>
+        </p:nvCxnSpPr>
+        <p:spPr>
+          <a:xfrm flipV="1">
+            <a:off x="3384331" y="3001138"/>
+            <a:ext cx="261550" cy="2327606"/>
+          </a:xfrm>
+          <a:prstGeom prst="straightConnector1">
+            <a:avLst/>
+          </a:prstGeom>
+          <a:noFill/>
+          <a:ln w="38100" cap="flat" cmpd="sng" algn="ctr">
+            <a:solidFill>
+              <a:srgbClr val="00B050"/>
+            </a:solidFill>
+            <a:prstDash val="solid"/>
+            <a:miter lim="800000"/>
+            <a:tailEnd type="triangle"/>
+          </a:ln>
+          <a:effectLst/>
+        </p:spPr>
+      </p:cxnSp>
+      <p:cxnSp>
+        <p:nvCxnSpPr>
+          <p:cNvPr id="12" name="Straight Arrow Connector 11">
+            <a:extLst>
+              <a:ext uri="{FF2B5EF4-FFF2-40B4-BE49-F238E27FC236}">
+                <a16:creationId xmlns:a16="http://schemas.microsoft.com/office/drawing/2014/main" id="{9509DDF1-2636-4EDD-9170-A50E264212E7}"/>
+              </a:ext>
+            </a:extLst>
+          </p:cNvPr>
+          <p:cNvCxnSpPr>
+            <a:cxnSpLocks/>
+            <a:stCxn id="23" idx="0"/>
+            <a:endCxn id="42" idx="2"/>
+          </p:cNvCxnSpPr>
+          <p:nvPr/>
+        </p:nvCxnSpPr>
+        <p:spPr>
+          <a:xfrm flipV="1">
+            <a:off x="3384331" y="3001138"/>
+            <a:ext cx="597251" cy="2327606"/>
+          </a:xfrm>
+          <a:prstGeom prst="straightConnector1">
+            <a:avLst/>
+          </a:prstGeom>
+          <a:noFill/>
+          <a:ln w="38100" cap="flat" cmpd="sng" algn="ctr">
+            <a:solidFill>
+              <a:srgbClr val="00B050"/>
+            </a:solidFill>
+            <a:prstDash val="solid"/>
+            <a:miter lim="800000"/>
+            <a:tailEnd type="triangle"/>
+          </a:ln>
+          <a:effectLst/>
+        </p:spPr>
+      </p:cxnSp>
+      <p:cxnSp>
+        <p:nvCxnSpPr>
+          <p:cNvPr id="13" name="Straight Arrow Connector 12">
+            <a:extLst>
+              <a:ext uri="{FF2B5EF4-FFF2-40B4-BE49-F238E27FC236}">
+                <a16:creationId xmlns:a16="http://schemas.microsoft.com/office/drawing/2014/main" id="{8B718C9C-7B80-4DA4-AB30-68C985AF3695}"/>
+              </a:ext>
+            </a:extLst>
+          </p:cNvPr>
+          <p:cNvCxnSpPr>
+            <a:cxnSpLocks/>
+            <a:stCxn id="23" idx="0"/>
+            <a:endCxn id="43" idx="2"/>
+          </p:cNvCxnSpPr>
+          <p:nvPr/>
+        </p:nvCxnSpPr>
+        <p:spPr>
+          <a:xfrm flipV="1">
+            <a:off x="3384331" y="3001138"/>
+            <a:ext cx="932953" cy="2327606"/>
+          </a:xfrm>
+          <a:prstGeom prst="straightConnector1">
+            <a:avLst/>
+          </a:prstGeom>
+          <a:noFill/>
+          <a:ln w="38100" cap="flat" cmpd="sng" algn="ctr">
+            <a:solidFill>
+              <a:srgbClr val="00B050"/>
+            </a:solidFill>
+            <a:prstDash val="solid"/>
+            <a:miter lim="800000"/>
+            <a:tailEnd type="triangle"/>
+          </a:ln>
+          <a:effectLst/>
+        </p:spPr>
+      </p:cxnSp>
+      <p:cxnSp>
+        <p:nvCxnSpPr>
+          <p:cNvPr id="14" name="Straight Arrow Connector 13">
+            <a:extLst>
+              <a:ext uri="{FF2B5EF4-FFF2-40B4-BE49-F238E27FC236}">
+                <a16:creationId xmlns:a16="http://schemas.microsoft.com/office/drawing/2014/main" id="{93FEC023-CCE4-4A61-82FA-3B7CE85E3AE5}"/>
+              </a:ext>
+            </a:extLst>
+          </p:cNvPr>
+          <p:cNvCxnSpPr>
+            <a:cxnSpLocks/>
+            <a:stCxn id="23" idx="0"/>
+            <a:endCxn id="44" idx="2"/>
+          </p:cNvCxnSpPr>
+          <p:nvPr/>
+        </p:nvCxnSpPr>
+        <p:spPr>
+          <a:xfrm flipV="1">
+            <a:off x="3384331" y="3003745"/>
+            <a:ext cx="1268551" cy="2324999"/>
+          </a:xfrm>
+          <a:prstGeom prst="straightConnector1">
+            <a:avLst/>
+          </a:prstGeom>
+          <a:noFill/>
+          <a:ln w="38100" cap="flat" cmpd="sng" algn="ctr">
+            <a:solidFill>
+              <a:srgbClr val="00B050"/>
+            </a:solidFill>
+            <a:prstDash val="solid"/>
+            <a:miter lim="800000"/>
+            <a:tailEnd type="triangle"/>
+          </a:ln>
+          <a:effectLst/>
+        </p:spPr>
+      </p:cxnSp>
+      <p:cxnSp>
+        <p:nvCxnSpPr>
+          <p:cNvPr id="15" name="Straight Arrow Connector 14">
+            <a:extLst>
+              <a:ext uri="{FF2B5EF4-FFF2-40B4-BE49-F238E27FC236}">
+                <a16:creationId xmlns:a16="http://schemas.microsoft.com/office/drawing/2014/main" id="{9018D925-F97D-47DF-9FA9-A47B9650F1F3}"/>
+              </a:ext>
+            </a:extLst>
+          </p:cNvPr>
+          <p:cNvCxnSpPr>
+            <a:cxnSpLocks/>
+            <a:stCxn id="23" idx="0"/>
+            <a:endCxn id="41" idx="2"/>
+          </p:cNvCxnSpPr>
+          <p:nvPr/>
+        </p:nvCxnSpPr>
+        <p:spPr>
+          <a:xfrm flipV="1">
+            <a:off x="3384331" y="3003745"/>
+            <a:ext cx="1600152" cy="2324999"/>
+          </a:xfrm>
+          <a:prstGeom prst="straightConnector1">
+            <a:avLst/>
+          </a:prstGeom>
+          <a:noFill/>
+          <a:ln w="38100" cap="flat" cmpd="sng" algn="ctr">
+            <a:solidFill>
+              <a:srgbClr val="00B050"/>
+            </a:solidFill>
+            <a:prstDash val="solid"/>
+            <a:miter lim="800000"/>
+            <a:tailEnd type="triangle"/>
+          </a:ln>
+          <a:effectLst/>
+        </p:spPr>
+      </p:cxnSp>
+      <p:cxnSp>
+        <p:nvCxnSpPr>
+          <p:cNvPr id="16" name="Straight Arrow Connector 15">
+            <a:extLst>
+              <a:ext uri="{FF2B5EF4-FFF2-40B4-BE49-F238E27FC236}">
+                <a16:creationId xmlns:a16="http://schemas.microsoft.com/office/drawing/2014/main" id="{B8401EE3-FE1B-4945-8838-A3601434842F}"/>
+              </a:ext>
+            </a:extLst>
+          </p:cNvPr>
+          <p:cNvCxnSpPr>
+            <a:cxnSpLocks/>
+            <a:stCxn id="23" idx="0"/>
+            <a:endCxn id="38" idx="2"/>
+          </p:cNvCxnSpPr>
+          <p:nvPr/>
+        </p:nvCxnSpPr>
+        <p:spPr>
+          <a:xfrm flipV="1">
+            <a:off x="3384331" y="3003745"/>
+            <a:ext cx="1935854" cy="2324999"/>
+          </a:xfrm>
+          <a:prstGeom prst="straightConnector1">
+            <a:avLst/>
+          </a:prstGeom>
+          <a:noFill/>
+          <a:ln w="38100" cap="flat" cmpd="sng" algn="ctr">
+            <a:solidFill>
+              <a:srgbClr val="00B050"/>
+            </a:solidFill>
+            <a:prstDash val="solid"/>
+            <a:miter lim="800000"/>
+            <a:tailEnd type="triangle"/>
+          </a:ln>
+          <a:effectLst/>
+        </p:spPr>
+      </p:cxnSp>
+      <p:cxnSp>
+        <p:nvCxnSpPr>
+          <p:cNvPr id="17" name="Straight Arrow Connector 16">
+            <a:extLst>
+              <a:ext uri="{FF2B5EF4-FFF2-40B4-BE49-F238E27FC236}">
+                <a16:creationId xmlns:a16="http://schemas.microsoft.com/office/drawing/2014/main" id="{DAC2E7D7-8109-427A-BB64-1FA36A2234FC}"/>
+              </a:ext>
+            </a:extLst>
+          </p:cNvPr>
+          <p:cNvCxnSpPr>
+            <a:cxnSpLocks/>
+            <a:stCxn id="23" idx="0"/>
+            <a:endCxn id="39" idx="2"/>
+          </p:cNvCxnSpPr>
+          <p:nvPr/>
+        </p:nvCxnSpPr>
+        <p:spPr>
+          <a:xfrm flipV="1">
+            <a:off x="3384331" y="3003745"/>
+            <a:ext cx="2271555" cy="2324999"/>
+          </a:xfrm>
+          <a:prstGeom prst="straightConnector1">
+            <a:avLst/>
+          </a:prstGeom>
+          <a:noFill/>
+          <a:ln w="38100" cap="flat" cmpd="sng" algn="ctr">
+            <a:solidFill>
+              <a:srgbClr val="00B050"/>
+            </a:solidFill>
+            <a:prstDash val="solid"/>
+            <a:miter lim="800000"/>
+            <a:tailEnd type="triangle"/>
+          </a:ln>
+          <a:effectLst/>
+        </p:spPr>
+      </p:cxnSp>
+      <p:cxnSp>
+        <p:nvCxnSpPr>
+          <p:cNvPr id="18" name="Straight Arrow Connector 17">
+            <a:extLst>
+              <a:ext uri="{FF2B5EF4-FFF2-40B4-BE49-F238E27FC236}">
+                <a16:creationId xmlns:a16="http://schemas.microsoft.com/office/drawing/2014/main" id="{30B49DAA-9066-4E9B-B574-1CA767605831}"/>
+              </a:ext>
+            </a:extLst>
+          </p:cNvPr>
+          <p:cNvCxnSpPr>
+            <a:cxnSpLocks/>
+            <a:stCxn id="23" idx="0"/>
+            <a:endCxn id="40" idx="2"/>
+          </p:cNvCxnSpPr>
+          <p:nvPr/>
+        </p:nvCxnSpPr>
+        <p:spPr>
+          <a:xfrm flipV="1">
+            <a:off x="3384331" y="3006352"/>
+            <a:ext cx="2607154" cy="2322392"/>
+          </a:xfrm>
+          <a:prstGeom prst="straightConnector1">
+            <a:avLst/>
+          </a:prstGeom>
+          <a:noFill/>
+          <a:ln w="38100" cap="flat" cmpd="sng" algn="ctr">
+            <a:solidFill>
+              <a:srgbClr val="00B050"/>
+            </a:solidFill>
+            <a:prstDash val="solid"/>
+            <a:miter lim="800000"/>
+            <a:tailEnd type="triangle"/>
+          </a:ln>
+          <a:effectLst/>
+        </p:spPr>
+      </p:cxnSp>
+      <p:cxnSp>
+        <p:nvCxnSpPr>
+          <p:cNvPr id="19" name="Straight Arrow Connector 18">
+            <a:extLst>
+              <a:ext uri="{FF2B5EF4-FFF2-40B4-BE49-F238E27FC236}">
+                <a16:creationId xmlns:a16="http://schemas.microsoft.com/office/drawing/2014/main" id="{2349B39B-5A69-4971-AE94-44B6CDFA0F4C}"/>
+              </a:ext>
+            </a:extLst>
+          </p:cNvPr>
+          <p:cNvCxnSpPr>
+            <a:cxnSpLocks/>
+            <a:stCxn id="23" idx="0"/>
+            <a:endCxn id="37" idx="2"/>
+          </p:cNvCxnSpPr>
+          <p:nvPr/>
+        </p:nvCxnSpPr>
+        <p:spPr>
+          <a:xfrm flipV="1">
+            <a:off x="3384331" y="3006352"/>
+            <a:ext cx="2938755" cy="2322392"/>
+          </a:xfrm>
+          <a:prstGeom prst="straightConnector1">
+            <a:avLst/>
+          </a:prstGeom>
+          <a:noFill/>
+          <a:ln w="38100" cap="flat" cmpd="sng" algn="ctr">
+            <a:solidFill>
+              <a:srgbClr val="00B050"/>
+            </a:solidFill>
+            <a:prstDash val="solid"/>
+            <a:miter lim="800000"/>
+            <a:tailEnd type="triangle"/>
+          </a:ln>
+          <a:effectLst/>
+        </p:spPr>
+      </p:cxnSp>
+      <p:sp>
+        <p:nvSpPr>
+          <p:cNvPr id="21" name="Rounded Rectangle 3">
+            <a:extLst>
+              <a:ext uri="{FF2B5EF4-FFF2-40B4-BE49-F238E27FC236}">
+                <a16:creationId xmlns:a16="http://schemas.microsoft.com/office/drawing/2014/main" id="{C310F792-EB2F-4712-8D9E-6BA942509EA5}"/>
+              </a:ext>
+            </a:extLst>
+          </p:cNvPr>
+          <p:cNvSpPr/>
+          <p:nvPr/>
+        </p:nvSpPr>
+        <p:spPr>
+          <a:xfrm>
+            <a:off x="409903" y="5896303"/>
+            <a:ext cx="11393214" cy="714704"/>
+          </a:xfrm>
+          <a:prstGeom prst="roundRect">
+            <a:avLst/>
+          </a:prstGeom>
+          <a:solidFill>
+            <a:srgbClr val="DD3397"/>
+          </a:solidFill>
+          <a:ln w="12700" cap="flat" cmpd="sng" algn="ctr">
+            <a:solidFill>
+              <a:srgbClr val="DD3397">
+                <a:shade val="50000"/>
+              </a:srgbClr>
+            </a:solidFill>
+            <a:prstDash val="solid"/>
+            <a:miter lim="800000"/>
+          </a:ln>
+          <a:effectLst/>
+        </p:spPr>
+        <p:txBody>
+          <a:bodyPr rtlCol="0" anchor="ctr"/>
+          <a:lstStyle/>
+          <a:p>
+            <a:pPr marL="0" marR="0" lvl="0" indent="0" algn="ctr" defTabSz="914400" eaLnBrk="1" fontAlgn="auto" latinLnBrk="0" hangingPunct="1">
+              <a:lnSpc>
+                <a:spcPct val="100000"/>
+              </a:lnSpc>
+              <a:spcBef>
+                <a:spcPts val="0"/>
+              </a:spcBef>
+              <a:spcAft>
+                <a:spcPts val="0"/>
+              </a:spcAft>
+              <a:buClrTx/>
+              <a:buSzTx/>
+              <a:buFontTx/>
+              <a:buNone/>
+              <a:tabLst/>
+              <a:defRPr/>
+            </a:pPr>
+            <a:r>
+              <a:rPr kumimoji="0" lang="en-US" sz="1800" b="0" i="0" u="none" strike="noStrike" kern="0" cap="none" spc="0" normalizeH="0" baseline="0" noProof="0" dirty="0">
+                <a:ln>
+                  <a:noFill/>
+                </a:ln>
+                <a:solidFill>
+                  <a:srgbClr val="FFFFFF"/>
+                </a:solidFill>
+                <a:effectLst/>
+                <a:uLnTx/>
+                <a:uFillTx/>
+                <a:latin typeface="Open sans"/>
+                <a:ea typeface="+mn-ea"/>
+                <a:cs typeface="+mn-cs"/>
+              </a:rPr>
+              <a:t>Kubernetes</a:t>
+            </a:r>
+          </a:p>
+        </p:txBody>
+      </p:sp>
+      <p:sp>
+        <p:nvSpPr>
+          <p:cNvPr id="22" name="Rounded Rectangle 4">
+            <a:extLst>
+              <a:ext uri="{FF2B5EF4-FFF2-40B4-BE49-F238E27FC236}">
+                <a16:creationId xmlns:a16="http://schemas.microsoft.com/office/drawing/2014/main" id="{041F7D0D-23EC-411B-B68B-C7708D1F6BFC}"/>
+              </a:ext>
+            </a:extLst>
+          </p:cNvPr>
+          <p:cNvSpPr/>
+          <p:nvPr/>
+        </p:nvSpPr>
+        <p:spPr>
+          <a:xfrm>
+            <a:off x="746234" y="5328745"/>
+            <a:ext cx="1608083" cy="693683"/>
+          </a:xfrm>
+          <a:prstGeom prst="roundRect">
+            <a:avLst/>
+          </a:prstGeom>
+          <a:solidFill>
+            <a:srgbClr val="2194CB"/>
+          </a:solidFill>
+          <a:ln w="12700" cap="flat" cmpd="sng" algn="ctr">
+            <a:solidFill>
+              <a:srgbClr val="2194CB">
+                <a:shade val="50000"/>
+              </a:srgbClr>
+            </a:solidFill>
+            <a:prstDash val="solid"/>
+            <a:miter lim="800000"/>
+          </a:ln>
+          <a:effectLst/>
+        </p:spPr>
+        <p:txBody>
+          <a:bodyPr rtlCol="0" anchor="ctr"/>
+          <a:lstStyle/>
+          <a:p>
+            <a:pPr marL="0" marR="0" lvl="0" indent="0" algn="ctr" defTabSz="914400" eaLnBrk="1" fontAlgn="auto" latinLnBrk="0" hangingPunct="1">
+              <a:lnSpc>
+                <a:spcPct val="100000"/>
+              </a:lnSpc>
+              <a:spcBef>
+                <a:spcPts val="0"/>
+              </a:spcBef>
+              <a:spcAft>
+                <a:spcPts val="0"/>
+              </a:spcAft>
+              <a:buClrTx/>
+              <a:buSzTx/>
+              <a:buFontTx/>
+              <a:buNone/>
+              <a:tabLst/>
+              <a:defRPr/>
+            </a:pPr>
+            <a:r>
+              <a:rPr kumimoji="0" lang="en-US" sz="1800" b="0" i="0" u="none" strike="noStrike" kern="0" cap="none" spc="0" normalizeH="0" baseline="0" noProof="0" dirty="0">
+                <a:ln>
+                  <a:noFill/>
+                </a:ln>
+                <a:solidFill>
+                  <a:srgbClr val="FFFFFF"/>
+                </a:solidFill>
+                <a:effectLst/>
+                <a:uLnTx/>
+                <a:uFillTx/>
+                <a:latin typeface="Open sans"/>
+                <a:ea typeface="+mn-ea"/>
+                <a:cs typeface="+mn-cs"/>
+              </a:rPr>
+              <a:t>Replica</a:t>
+            </a:r>
+          </a:p>
+        </p:txBody>
+      </p:sp>
+      <p:sp>
+        <p:nvSpPr>
+          <p:cNvPr id="23" name="Rounded Rectangle 6">
+            <a:extLst>
+              <a:ext uri="{FF2B5EF4-FFF2-40B4-BE49-F238E27FC236}">
+                <a16:creationId xmlns:a16="http://schemas.microsoft.com/office/drawing/2014/main" id="{0D6B6A1B-EC38-4F9C-ACA4-8C9EBCD95BE9}"/>
+              </a:ext>
+            </a:extLst>
+          </p:cNvPr>
+          <p:cNvSpPr/>
+          <p:nvPr/>
+        </p:nvSpPr>
+        <p:spPr>
+          <a:xfrm>
+            <a:off x="2580289" y="5328744"/>
+            <a:ext cx="1608083" cy="693683"/>
+          </a:xfrm>
+          <a:prstGeom prst="roundRect">
+            <a:avLst/>
+          </a:prstGeom>
+          <a:solidFill>
+            <a:srgbClr val="2194CB"/>
+          </a:solidFill>
+          <a:ln w="12700" cap="flat" cmpd="sng" algn="ctr">
+            <a:solidFill>
+              <a:srgbClr val="2194CB">
+                <a:shade val="50000"/>
+              </a:srgbClr>
+            </a:solidFill>
+            <a:prstDash val="solid"/>
+            <a:miter lim="800000"/>
+          </a:ln>
+          <a:effectLst/>
+        </p:spPr>
+        <p:txBody>
+          <a:bodyPr rtlCol="0" anchor="ctr"/>
+          <a:lstStyle/>
+          <a:p>
+            <a:pPr marL="0" marR="0" lvl="0" indent="0" algn="ctr" defTabSz="914400" eaLnBrk="1" fontAlgn="auto" latinLnBrk="0" hangingPunct="1">
+              <a:lnSpc>
+                <a:spcPct val="100000"/>
+              </a:lnSpc>
+              <a:spcBef>
+                <a:spcPts val="0"/>
+              </a:spcBef>
+              <a:spcAft>
+                <a:spcPts val="0"/>
+              </a:spcAft>
+              <a:buClrTx/>
+              <a:buSzTx/>
+              <a:buFontTx/>
+              <a:buNone/>
+              <a:tabLst/>
+              <a:defRPr/>
+            </a:pPr>
+            <a:r>
+              <a:rPr kumimoji="0" lang="en-US" sz="1800" b="0" i="0" u="none" strike="noStrike" kern="0" cap="none" spc="0" normalizeH="0" baseline="0" noProof="0" dirty="0">
+                <a:ln>
+                  <a:noFill/>
+                </a:ln>
+                <a:solidFill>
+                  <a:srgbClr val="FFFFFF"/>
+                </a:solidFill>
+                <a:effectLst/>
+                <a:uLnTx/>
+                <a:uFillTx/>
+                <a:latin typeface="Open sans"/>
+                <a:ea typeface="+mn-ea"/>
+                <a:cs typeface="+mn-cs"/>
+              </a:rPr>
+              <a:t>Replica</a:t>
+            </a:r>
+          </a:p>
+        </p:txBody>
+      </p:sp>
+      <p:sp>
+        <p:nvSpPr>
+          <p:cNvPr id="24" name="Rounded Rectangle 8">
+            <a:extLst>
+              <a:ext uri="{FF2B5EF4-FFF2-40B4-BE49-F238E27FC236}">
+                <a16:creationId xmlns:a16="http://schemas.microsoft.com/office/drawing/2014/main" id="{2FA59B42-DA0C-4301-843E-6B27314BA737}"/>
+              </a:ext>
+            </a:extLst>
+          </p:cNvPr>
+          <p:cNvSpPr/>
+          <p:nvPr/>
+        </p:nvSpPr>
+        <p:spPr>
+          <a:xfrm>
+            <a:off x="4440620" y="5328745"/>
+            <a:ext cx="1608083" cy="693683"/>
+          </a:xfrm>
+          <a:prstGeom prst="roundRect">
+            <a:avLst/>
+          </a:prstGeom>
+          <a:solidFill>
+            <a:srgbClr val="2194CB"/>
+          </a:solidFill>
+          <a:ln w="12700" cap="flat" cmpd="sng" algn="ctr">
+            <a:solidFill>
+              <a:srgbClr val="2194CB">
+                <a:shade val="50000"/>
+              </a:srgbClr>
+            </a:solidFill>
+            <a:prstDash val="solid"/>
+            <a:miter lim="800000"/>
+          </a:ln>
+          <a:effectLst/>
+        </p:spPr>
+        <p:txBody>
+          <a:bodyPr rtlCol="0" anchor="ctr"/>
+          <a:lstStyle/>
+          <a:p>
+            <a:pPr marL="0" marR="0" lvl="0" indent="0" algn="ctr" defTabSz="914400" eaLnBrk="1" fontAlgn="auto" latinLnBrk="0" hangingPunct="1">
+              <a:lnSpc>
+                <a:spcPct val="100000"/>
+              </a:lnSpc>
+              <a:spcBef>
+                <a:spcPts val="0"/>
+              </a:spcBef>
+              <a:spcAft>
+                <a:spcPts val="0"/>
+              </a:spcAft>
+              <a:buClrTx/>
+              <a:buSzTx/>
+              <a:buFontTx/>
+              <a:buNone/>
+              <a:tabLst/>
+              <a:defRPr/>
+            </a:pPr>
+            <a:r>
+              <a:rPr kumimoji="0" lang="en-US" sz="1800" b="0" i="0" u="none" strike="noStrike" kern="0" cap="none" spc="0" normalizeH="0" baseline="0" noProof="0" dirty="0">
+                <a:ln>
+                  <a:noFill/>
+                </a:ln>
+                <a:solidFill>
+                  <a:srgbClr val="FFFFFF"/>
+                </a:solidFill>
+                <a:effectLst/>
+                <a:uLnTx/>
+                <a:uFillTx/>
+                <a:latin typeface="Open sans"/>
+                <a:ea typeface="+mn-ea"/>
+                <a:cs typeface="+mn-cs"/>
+              </a:rPr>
+              <a:t>Replica</a:t>
+            </a:r>
+          </a:p>
+        </p:txBody>
+      </p:sp>
+      <p:sp>
+        <p:nvSpPr>
+          <p:cNvPr id="25" name="Rounded Rectangle 10">
+            <a:extLst>
+              <a:ext uri="{FF2B5EF4-FFF2-40B4-BE49-F238E27FC236}">
+                <a16:creationId xmlns:a16="http://schemas.microsoft.com/office/drawing/2014/main" id="{99BE9BE4-6D96-423F-AA0B-A98F7C17E01F}"/>
+              </a:ext>
+            </a:extLst>
+          </p:cNvPr>
+          <p:cNvSpPr/>
+          <p:nvPr/>
+        </p:nvSpPr>
+        <p:spPr>
+          <a:xfrm>
+            <a:off x="6274675" y="5328744"/>
+            <a:ext cx="1608083" cy="693683"/>
+          </a:xfrm>
+          <a:prstGeom prst="roundRect">
+            <a:avLst/>
+          </a:prstGeom>
+          <a:solidFill>
+            <a:srgbClr val="2194CB"/>
+          </a:solidFill>
+          <a:ln w="12700" cap="flat" cmpd="sng" algn="ctr">
+            <a:solidFill>
+              <a:srgbClr val="2194CB">
+                <a:shade val="50000"/>
+              </a:srgbClr>
+            </a:solidFill>
+            <a:prstDash val="solid"/>
+            <a:miter lim="800000"/>
+          </a:ln>
+          <a:effectLst/>
+        </p:spPr>
+        <p:txBody>
+          <a:bodyPr rtlCol="0" anchor="ctr"/>
+          <a:lstStyle/>
+          <a:p>
+            <a:pPr marL="0" marR="0" lvl="0" indent="0" algn="ctr" defTabSz="914400" eaLnBrk="1" fontAlgn="auto" latinLnBrk="0" hangingPunct="1">
+              <a:lnSpc>
+                <a:spcPct val="100000"/>
+              </a:lnSpc>
+              <a:spcBef>
+                <a:spcPts val="0"/>
+              </a:spcBef>
+              <a:spcAft>
+                <a:spcPts val="0"/>
+              </a:spcAft>
+              <a:buClrTx/>
+              <a:buSzTx/>
+              <a:buFontTx/>
+              <a:buNone/>
+              <a:tabLst/>
+              <a:defRPr/>
+            </a:pPr>
+            <a:r>
+              <a:rPr kumimoji="0" lang="en-US" sz="1800" b="0" i="0" u="none" strike="noStrike" kern="0" cap="none" spc="0" normalizeH="0" baseline="0" noProof="0" dirty="0">
+                <a:ln>
+                  <a:noFill/>
+                </a:ln>
+                <a:solidFill>
+                  <a:srgbClr val="FFFFFF"/>
+                </a:solidFill>
+                <a:effectLst/>
+                <a:uLnTx/>
+                <a:uFillTx/>
+                <a:latin typeface="Open sans"/>
+                <a:ea typeface="+mn-ea"/>
+                <a:cs typeface="+mn-cs"/>
+              </a:rPr>
+              <a:t>Replica</a:t>
+            </a:r>
+          </a:p>
+        </p:txBody>
+      </p:sp>
+      <p:sp>
+        <p:nvSpPr>
+          <p:cNvPr id="26" name="Can 11">
+            <a:extLst>
+              <a:ext uri="{FF2B5EF4-FFF2-40B4-BE49-F238E27FC236}">
+                <a16:creationId xmlns:a16="http://schemas.microsoft.com/office/drawing/2014/main" id="{8921687A-5AC3-48A3-9A7A-4CD898A124CB}"/>
+              </a:ext>
+            </a:extLst>
+          </p:cNvPr>
+          <p:cNvSpPr/>
+          <p:nvPr/>
+        </p:nvSpPr>
+        <p:spPr>
+          <a:xfrm>
+            <a:off x="10266399" y="2515583"/>
+            <a:ext cx="1460938" cy="1639614"/>
+          </a:xfrm>
+          <a:prstGeom prst="can">
+            <a:avLst/>
+          </a:prstGeom>
+          <a:solidFill>
+            <a:srgbClr val="4A31CF"/>
+          </a:solidFill>
+          <a:ln w="12700" cap="flat" cmpd="sng" algn="ctr">
+            <a:solidFill>
+              <a:srgbClr val="4A31CF">
+                <a:shade val="50000"/>
+              </a:srgbClr>
+            </a:solidFill>
+            <a:prstDash val="solid"/>
+            <a:miter lim="800000"/>
+          </a:ln>
+          <a:effectLst/>
+        </p:spPr>
+        <p:txBody>
+          <a:bodyPr rtlCol="0" anchor="ctr"/>
+          <a:lstStyle/>
+          <a:p>
+            <a:pPr marL="0" marR="0" lvl="0" indent="0" algn="ctr" defTabSz="914400" eaLnBrk="1" fontAlgn="auto" latinLnBrk="0" hangingPunct="1">
+              <a:lnSpc>
+                <a:spcPct val="100000"/>
+              </a:lnSpc>
+              <a:spcBef>
+                <a:spcPts val="0"/>
+              </a:spcBef>
+              <a:spcAft>
+                <a:spcPts val="0"/>
+              </a:spcAft>
+              <a:buClrTx/>
+              <a:buSzTx/>
+              <a:buFontTx/>
+              <a:buNone/>
+              <a:tabLst/>
+              <a:defRPr/>
+            </a:pPr>
+            <a:r>
+              <a:rPr kumimoji="0" lang="en-US" sz="1800" b="0" i="0" u="none" strike="noStrike" kern="0" cap="none" spc="0" normalizeH="0" baseline="0" noProof="0" dirty="0">
+                <a:ln>
+                  <a:noFill/>
+                </a:ln>
+                <a:solidFill>
+                  <a:srgbClr val="FFFFFF"/>
+                </a:solidFill>
+                <a:effectLst/>
+                <a:uLnTx/>
+                <a:uFillTx/>
+                <a:latin typeface="Open sans"/>
+                <a:ea typeface="+mn-ea"/>
+                <a:cs typeface="+mn-cs"/>
+              </a:rPr>
+              <a:t>Cosmos</a:t>
+            </a:r>
+          </a:p>
+          <a:p>
+            <a:pPr marL="0" marR="0" lvl="0" indent="0" algn="ctr" defTabSz="914400" eaLnBrk="1" fontAlgn="auto" latinLnBrk="0" hangingPunct="1">
+              <a:lnSpc>
+                <a:spcPct val="100000"/>
+              </a:lnSpc>
+              <a:spcBef>
+                <a:spcPts val="0"/>
+              </a:spcBef>
+              <a:spcAft>
+                <a:spcPts val="0"/>
+              </a:spcAft>
+              <a:buClrTx/>
+              <a:buSzTx/>
+              <a:buFontTx/>
+              <a:buNone/>
+              <a:tabLst/>
+              <a:defRPr/>
+            </a:pPr>
+            <a:r>
+              <a:rPr kumimoji="0" lang="en-US" sz="1800" b="0" i="0" u="none" strike="noStrike" kern="0" cap="none" spc="0" normalizeH="0" baseline="0" noProof="0" dirty="0">
+                <a:ln>
+                  <a:noFill/>
+                </a:ln>
+                <a:solidFill>
+                  <a:srgbClr val="FFFFFF"/>
+                </a:solidFill>
+                <a:effectLst/>
+                <a:uLnTx/>
+                <a:uFillTx/>
+                <a:latin typeface="Open sans"/>
+                <a:ea typeface="+mn-ea"/>
+                <a:cs typeface="+mn-cs"/>
+              </a:rPr>
+              <a:t>26K RU</a:t>
+            </a:r>
+          </a:p>
+        </p:txBody>
+      </p:sp>
+      <p:sp>
+        <p:nvSpPr>
+          <p:cNvPr id="27" name="Down Arrow 12">
+            <a:extLst>
+              <a:ext uri="{FF2B5EF4-FFF2-40B4-BE49-F238E27FC236}">
+                <a16:creationId xmlns:a16="http://schemas.microsoft.com/office/drawing/2014/main" id="{411EE859-157F-4D85-8DF1-FE75DFA606F8}"/>
+              </a:ext>
+            </a:extLst>
+          </p:cNvPr>
+          <p:cNvSpPr/>
+          <p:nvPr/>
+        </p:nvSpPr>
+        <p:spPr>
+          <a:xfrm>
+            <a:off x="3088755" y="3623417"/>
+            <a:ext cx="588579" cy="1890548"/>
+          </a:xfrm>
+          <a:prstGeom prst="downArrow">
+            <a:avLst/>
+          </a:prstGeom>
+          <a:solidFill>
+            <a:srgbClr val="92D050"/>
+          </a:solidFill>
+          <a:ln w="12700" cap="flat" cmpd="sng" algn="ctr">
+            <a:solidFill>
+              <a:srgbClr val="00B050"/>
+            </a:solidFill>
+            <a:prstDash val="solid"/>
+            <a:miter lim="800000"/>
+          </a:ln>
+          <a:effectLst/>
+        </p:spPr>
+        <p:txBody>
+          <a:bodyPr rtlCol="0" anchor="ctr"/>
+          <a:lstStyle/>
+          <a:p>
+            <a:pPr marL="0" marR="0" lvl="0" indent="0" algn="ctr" defTabSz="914400" eaLnBrk="1" fontAlgn="auto" latinLnBrk="0" hangingPunct="1">
+              <a:lnSpc>
+                <a:spcPct val="100000"/>
+              </a:lnSpc>
+              <a:spcBef>
+                <a:spcPts val="0"/>
+              </a:spcBef>
+              <a:spcAft>
+                <a:spcPts val="0"/>
+              </a:spcAft>
+              <a:buClrTx/>
+              <a:buSzTx/>
+              <a:buFontTx/>
+              <a:buNone/>
+              <a:tabLst/>
+              <a:defRPr/>
+            </a:pPr>
+            <a:endParaRPr kumimoji="0" lang="en-US" sz="1800" b="0" i="0" u="none" strike="noStrike" kern="0" cap="none" spc="0" normalizeH="0" baseline="0" noProof="0">
+              <a:ln>
+                <a:noFill/>
+              </a:ln>
+              <a:solidFill>
+                <a:srgbClr val="FFFFFF"/>
+              </a:solidFill>
+              <a:effectLst/>
+              <a:uLnTx/>
+              <a:uFillTx/>
+              <a:latin typeface="Open sans"/>
+              <a:ea typeface="+mn-ea"/>
+              <a:cs typeface="+mn-cs"/>
+            </a:endParaRPr>
+          </a:p>
+        </p:txBody>
+      </p:sp>
+      <p:sp>
+        <p:nvSpPr>
+          <p:cNvPr id="31" name="Down Arrow 31">
+            <a:extLst>
+              <a:ext uri="{FF2B5EF4-FFF2-40B4-BE49-F238E27FC236}">
+                <a16:creationId xmlns:a16="http://schemas.microsoft.com/office/drawing/2014/main" id="{3C86908B-A7F4-4F06-8627-884D91A6469D}"/>
+              </a:ext>
+            </a:extLst>
+          </p:cNvPr>
+          <p:cNvSpPr/>
+          <p:nvPr/>
+        </p:nvSpPr>
+        <p:spPr>
+          <a:xfrm>
+            <a:off x="1253358" y="3574832"/>
+            <a:ext cx="588579" cy="1890548"/>
+          </a:xfrm>
+          <a:prstGeom prst="downArrow">
+            <a:avLst/>
+          </a:prstGeom>
+          <a:solidFill>
+            <a:srgbClr val="F0F3F1"/>
+          </a:solidFill>
+          <a:ln w="12700" cap="flat" cmpd="sng" algn="ctr">
+            <a:solidFill>
+              <a:srgbClr val="000000"/>
+            </a:solidFill>
+            <a:prstDash val="dash"/>
+            <a:miter lim="800000"/>
+          </a:ln>
+          <a:effectLst/>
+        </p:spPr>
+        <p:txBody>
+          <a:bodyPr rtlCol="0" anchor="ctr"/>
+          <a:lstStyle/>
+          <a:p>
+            <a:pPr marL="0" marR="0" lvl="0" indent="0" algn="ctr" defTabSz="914400" eaLnBrk="1" fontAlgn="auto" latinLnBrk="0" hangingPunct="1">
+              <a:lnSpc>
+                <a:spcPct val="100000"/>
+              </a:lnSpc>
+              <a:spcBef>
+                <a:spcPts val="0"/>
+              </a:spcBef>
+              <a:spcAft>
+                <a:spcPts val="0"/>
+              </a:spcAft>
+              <a:buClrTx/>
+              <a:buSzTx/>
+              <a:buFontTx/>
+              <a:buNone/>
+              <a:tabLst/>
+              <a:defRPr/>
+            </a:pPr>
+            <a:endParaRPr kumimoji="0" lang="en-US" sz="1800" b="0" i="0" u="none" strike="noStrike" kern="0" cap="none" spc="0" normalizeH="0" baseline="0" noProof="0">
+              <a:ln>
+                <a:noFill/>
+              </a:ln>
+              <a:solidFill>
+                <a:srgbClr val="FFFFFF"/>
+              </a:solidFill>
+              <a:effectLst/>
+              <a:uLnTx/>
+              <a:uFillTx/>
+              <a:latin typeface="Open sans"/>
+              <a:ea typeface="+mn-ea"/>
+              <a:cs typeface="+mn-cs"/>
+            </a:endParaRPr>
+          </a:p>
+        </p:txBody>
+      </p:sp>
+      <p:sp>
+        <p:nvSpPr>
+          <p:cNvPr id="34" name="Curved Left Arrow 35">
+            <a:extLst>
+              <a:ext uri="{FF2B5EF4-FFF2-40B4-BE49-F238E27FC236}">
+                <a16:creationId xmlns:a16="http://schemas.microsoft.com/office/drawing/2014/main" id="{0E5110DA-CA38-4170-A773-4295D7330B6E}"/>
+              </a:ext>
+            </a:extLst>
+          </p:cNvPr>
+          <p:cNvSpPr/>
+          <p:nvPr/>
+        </p:nvSpPr>
+        <p:spPr>
+          <a:xfrm>
+            <a:off x="7205684" y="4204932"/>
+            <a:ext cx="267336" cy="312166"/>
+          </a:xfrm>
+          <a:prstGeom prst="curvedLeftArrow">
+            <a:avLst/>
+          </a:prstGeom>
+          <a:solidFill>
+            <a:srgbClr val="DD3397"/>
+          </a:solidFill>
+          <a:ln w="12700" cap="flat" cmpd="sng" algn="ctr">
+            <a:solidFill>
+              <a:srgbClr val="DD3397">
+                <a:shade val="50000"/>
+              </a:srgbClr>
+            </a:solidFill>
+            <a:prstDash val="solid"/>
+            <a:miter lim="800000"/>
+          </a:ln>
+          <a:effectLst/>
+        </p:spPr>
+        <p:txBody>
+          <a:bodyPr rtlCol="0" anchor="ctr"/>
+          <a:lstStyle/>
+          <a:p>
+            <a:pPr marL="0" marR="0" lvl="0" indent="0" algn="ctr" defTabSz="914400" eaLnBrk="1" fontAlgn="auto" latinLnBrk="0" hangingPunct="1">
+              <a:lnSpc>
+                <a:spcPct val="100000"/>
+              </a:lnSpc>
+              <a:spcBef>
+                <a:spcPts val="0"/>
+              </a:spcBef>
+              <a:spcAft>
+                <a:spcPts val="0"/>
+              </a:spcAft>
+              <a:buClrTx/>
+              <a:buSzTx/>
+              <a:buFontTx/>
+              <a:buNone/>
+              <a:tabLst/>
+              <a:defRPr/>
+            </a:pPr>
+            <a:endParaRPr kumimoji="0" lang="en-US" sz="1800" b="0" i="0" u="none" strike="noStrike" kern="0" cap="none" spc="0" normalizeH="0" baseline="0" noProof="0">
+              <a:ln>
+                <a:noFill/>
+              </a:ln>
+              <a:solidFill>
+                <a:srgbClr val="000000"/>
+              </a:solidFill>
+              <a:effectLst/>
+              <a:uLnTx/>
+              <a:uFillTx/>
+              <a:latin typeface="Open sans"/>
+              <a:ea typeface="+mn-ea"/>
+              <a:cs typeface="+mn-cs"/>
+            </a:endParaRPr>
+          </a:p>
+        </p:txBody>
+      </p:sp>
+      <p:sp>
+        <p:nvSpPr>
+          <p:cNvPr id="35" name="Rounded Rectangle 1">
+            <a:extLst>
+              <a:ext uri="{FF2B5EF4-FFF2-40B4-BE49-F238E27FC236}">
+                <a16:creationId xmlns:a16="http://schemas.microsoft.com/office/drawing/2014/main" id="{748FFBF3-2DC0-4026-BB4D-FA382BEB7FBE}"/>
+              </a:ext>
+            </a:extLst>
+          </p:cNvPr>
+          <p:cNvSpPr/>
+          <p:nvPr/>
+        </p:nvSpPr>
+        <p:spPr>
+          <a:xfrm>
+            <a:off x="409903" y="1903821"/>
+            <a:ext cx="6147875" cy="714704"/>
+          </a:xfrm>
+          <a:prstGeom prst="roundRect">
+            <a:avLst/>
+          </a:prstGeom>
+          <a:solidFill>
+            <a:srgbClr val="DD3397"/>
+          </a:solidFill>
+          <a:ln w="12700" cap="flat" cmpd="sng" algn="ctr">
+            <a:solidFill>
+              <a:srgbClr val="DD3397">
+                <a:shade val="50000"/>
+              </a:srgbClr>
+            </a:solidFill>
+            <a:prstDash val="solid"/>
+            <a:miter lim="800000"/>
+          </a:ln>
+          <a:effectLst/>
+        </p:spPr>
+        <p:txBody>
+          <a:bodyPr rtlCol="0" anchor="ctr"/>
+          <a:lstStyle/>
+          <a:p>
+            <a:pPr marL="0" marR="0" lvl="0" indent="0" algn="ctr" defTabSz="914400" eaLnBrk="1" fontAlgn="auto" latinLnBrk="0" hangingPunct="1">
+              <a:lnSpc>
+                <a:spcPct val="100000"/>
+              </a:lnSpc>
+              <a:spcBef>
+                <a:spcPts val="0"/>
+              </a:spcBef>
+              <a:spcAft>
+                <a:spcPts val="0"/>
+              </a:spcAft>
+              <a:buClrTx/>
+              <a:buSzTx/>
+              <a:buFontTx/>
+              <a:buNone/>
+              <a:tabLst/>
+              <a:defRPr/>
+            </a:pPr>
+            <a:r>
+              <a:rPr kumimoji="0" lang="en-US" sz="1800" b="0" i="0" u="none" strike="noStrike" kern="0" cap="none" spc="0" normalizeH="0" baseline="0" noProof="0" dirty="0">
+                <a:ln>
+                  <a:noFill/>
+                </a:ln>
+                <a:solidFill>
+                  <a:srgbClr val="FFFFFF"/>
+                </a:solidFill>
+                <a:effectLst/>
+                <a:uLnTx/>
+                <a:uFillTx/>
+                <a:latin typeface="Open sans"/>
+                <a:ea typeface="+mn-ea"/>
+                <a:cs typeface="+mn-cs"/>
+              </a:rPr>
+              <a:t>Azure Storage</a:t>
+            </a:r>
+          </a:p>
+        </p:txBody>
+      </p:sp>
+      <p:grpSp>
+        <p:nvGrpSpPr>
+          <p:cNvPr id="36" name="Group 35">
+            <a:extLst>
+              <a:ext uri="{FF2B5EF4-FFF2-40B4-BE49-F238E27FC236}">
+                <a16:creationId xmlns:a16="http://schemas.microsoft.com/office/drawing/2014/main" id="{6B449647-59AC-4460-B000-8DEC70444111}"/>
+              </a:ext>
+            </a:extLst>
+          </p:cNvPr>
+          <p:cNvGrpSpPr/>
+          <p:nvPr/>
+        </p:nvGrpSpPr>
+        <p:grpSpPr>
+          <a:xfrm>
+            <a:off x="530777" y="2455453"/>
+            <a:ext cx="5901554" cy="550899"/>
+            <a:chOff x="-969852" y="1553917"/>
+            <a:chExt cx="7381161" cy="1036509"/>
+          </a:xfrm>
+        </p:grpSpPr>
+        <p:sp>
+          <p:nvSpPr>
+            <p:cNvPr id="37" name="Rounded Rectangle 2">
+              <a:extLst>
+                <a:ext uri="{FF2B5EF4-FFF2-40B4-BE49-F238E27FC236}">
+                  <a16:creationId xmlns:a16="http://schemas.microsoft.com/office/drawing/2014/main" id="{D39E730F-F61F-4D57-A15C-1E6E41D56EE5}"/>
+                </a:ext>
+              </a:extLst>
+            </p:cNvPr>
+            <p:cNvSpPr/>
+            <p:nvPr/>
+          </p:nvSpPr>
+          <p:spPr>
+            <a:xfrm>
+              <a:off x="6138040" y="1582885"/>
+              <a:ext cx="273269" cy="1007541"/>
+            </a:xfrm>
+            <a:prstGeom prst="roundRect">
+              <a:avLst/>
+            </a:prstGeom>
+            <a:solidFill>
+              <a:srgbClr val="2194CB"/>
+            </a:solidFill>
+            <a:ln w="12700" cap="flat" cmpd="sng" algn="ctr">
+              <a:solidFill>
+                <a:srgbClr val="2194CB">
+                  <a:shade val="50000"/>
+                </a:srgbClr>
+              </a:solidFill>
+              <a:prstDash val="solid"/>
+              <a:miter lim="800000"/>
+            </a:ln>
+            <a:effectLst/>
+          </p:spPr>
+          <p:txBody>
+            <a:bodyPr rtlCol="0" anchor="ctr"/>
+            <a:lstStyle/>
+            <a:p>
+              <a:pPr marL="0" marR="0" lvl="0" indent="0" algn="ctr" defTabSz="914400" eaLnBrk="1" fontAlgn="auto" latinLnBrk="0" hangingPunct="1">
+                <a:lnSpc>
+                  <a:spcPct val="100000"/>
+                </a:lnSpc>
+                <a:spcBef>
+                  <a:spcPts val="0"/>
+                </a:spcBef>
+                <a:spcAft>
+                  <a:spcPts val="0"/>
+                </a:spcAft>
+                <a:buClrTx/>
+                <a:buSzTx/>
+                <a:buFontTx/>
+                <a:buNone/>
+                <a:tabLst/>
+                <a:defRPr/>
+              </a:pPr>
+              <a:r>
+                <a:rPr kumimoji="0" lang="en-US" sz="1800" b="0" i="0" u="none" strike="noStrike" kern="0" cap="none" spc="0" normalizeH="0" baseline="0" noProof="0" dirty="0">
+                  <a:ln>
+                    <a:noFill/>
+                  </a:ln>
+                  <a:solidFill>
+                    <a:srgbClr val="FFFFFF"/>
+                  </a:solidFill>
+                  <a:effectLst/>
+                  <a:uLnTx/>
+                  <a:uFillTx/>
+                  <a:latin typeface="Open sans"/>
+                  <a:ea typeface="+mn-ea"/>
+                  <a:cs typeface="+mn-cs"/>
+                </a:rPr>
+                <a:t>17</a:t>
+              </a:r>
+            </a:p>
+          </p:txBody>
+        </p:sp>
+        <p:sp>
+          <p:nvSpPr>
+            <p:cNvPr id="38" name="Rounded Rectangle 5">
+              <a:extLst>
+                <a:ext uri="{FF2B5EF4-FFF2-40B4-BE49-F238E27FC236}">
+                  <a16:creationId xmlns:a16="http://schemas.microsoft.com/office/drawing/2014/main" id="{133C4B74-B998-4579-A46D-C07AB5F43C23}"/>
+                </a:ext>
+              </a:extLst>
+            </p:cNvPr>
+            <p:cNvSpPr/>
+            <p:nvPr/>
+          </p:nvSpPr>
+          <p:spPr>
+            <a:xfrm>
+              <a:off x="4883697" y="1577980"/>
+              <a:ext cx="273269" cy="1007541"/>
+            </a:xfrm>
+            <a:prstGeom prst="roundRect">
+              <a:avLst/>
+            </a:prstGeom>
+            <a:solidFill>
+              <a:srgbClr val="2194CB"/>
+            </a:solidFill>
+            <a:ln w="12700" cap="flat" cmpd="sng" algn="ctr">
+              <a:solidFill>
+                <a:srgbClr val="2194CB">
+                  <a:shade val="50000"/>
+                </a:srgbClr>
+              </a:solidFill>
+              <a:prstDash val="solid"/>
+              <a:miter lim="800000"/>
+            </a:ln>
+            <a:effectLst/>
+          </p:spPr>
+          <p:txBody>
+            <a:bodyPr rtlCol="0" anchor="ctr"/>
+            <a:lstStyle/>
+            <a:p>
+              <a:pPr marL="0" marR="0" lvl="0" indent="0" algn="ctr" defTabSz="914400" eaLnBrk="1" fontAlgn="auto" latinLnBrk="0" hangingPunct="1">
+                <a:lnSpc>
+                  <a:spcPct val="100000"/>
+                </a:lnSpc>
+                <a:spcBef>
+                  <a:spcPts val="0"/>
+                </a:spcBef>
+                <a:spcAft>
+                  <a:spcPts val="0"/>
+                </a:spcAft>
+                <a:buClrTx/>
+                <a:buSzTx/>
+                <a:buFontTx/>
+                <a:buNone/>
+                <a:tabLst/>
+                <a:defRPr/>
+              </a:pPr>
+              <a:r>
+                <a:rPr kumimoji="0" lang="en-US" sz="1800" b="0" i="0" u="none" strike="noStrike" kern="0" cap="none" spc="0" normalizeH="0" baseline="0" noProof="0" dirty="0">
+                  <a:ln>
+                    <a:noFill/>
+                  </a:ln>
+                  <a:solidFill>
+                    <a:srgbClr val="FFFFFF"/>
+                  </a:solidFill>
+                  <a:effectLst/>
+                  <a:uLnTx/>
+                  <a:uFillTx/>
+                  <a:latin typeface="Open sans"/>
+                  <a:ea typeface="+mn-ea"/>
+                  <a:cs typeface="+mn-cs"/>
+                </a:rPr>
+                <a:t>14</a:t>
+              </a:r>
+            </a:p>
+          </p:txBody>
+        </p:sp>
+        <p:sp>
+          <p:nvSpPr>
+            <p:cNvPr id="39" name="Rounded Rectangle 7">
+              <a:extLst>
+                <a:ext uri="{FF2B5EF4-FFF2-40B4-BE49-F238E27FC236}">
+                  <a16:creationId xmlns:a16="http://schemas.microsoft.com/office/drawing/2014/main" id="{114E57A9-CB4A-408E-8061-5A1548400520}"/>
+                </a:ext>
+              </a:extLst>
+            </p:cNvPr>
+            <p:cNvSpPr/>
+            <p:nvPr/>
+          </p:nvSpPr>
+          <p:spPr>
+            <a:xfrm>
+              <a:off x="5303564" y="1577980"/>
+              <a:ext cx="273269" cy="1007541"/>
+            </a:xfrm>
+            <a:prstGeom prst="roundRect">
+              <a:avLst/>
+            </a:prstGeom>
+            <a:solidFill>
+              <a:srgbClr val="2194CB"/>
+            </a:solidFill>
+            <a:ln w="12700" cap="flat" cmpd="sng" algn="ctr">
+              <a:solidFill>
+                <a:srgbClr val="2194CB">
+                  <a:shade val="50000"/>
+                </a:srgbClr>
+              </a:solidFill>
+              <a:prstDash val="solid"/>
+              <a:miter lim="800000"/>
+            </a:ln>
+            <a:effectLst/>
+          </p:spPr>
+          <p:txBody>
+            <a:bodyPr rtlCol="0" anchor="ctr"/>
+            <a:lstStyle/>
+            <a:p>
+              <a:pPr marL="0" marR="0" lvl="0" indent="0" algn="ctr" defTabSz="914400" eaLnBrk="1" fontAlgn="auto" latinLnBrk="0" hangingPunct="1">
+                <a:lnSpc>
+                  <a:spcPct val="100000"/>
+                </a:lnSpc>
+                <a:spcBef>
+                  <a:spcPts val="0"/>
+                </a:spcBef>
+                <a:spcAft>
+                  <a:spcPts val="0"/>
+                </a:spcAft>
+                <a:buClrTx/>
+                <a:buSzTx/>
+                <a:buFontTx/>
+                <a:buNone/>
+                <a:tabLst/>
+                <a:defRPr/>
+              </a:pPr>
+              <a:r>
+                <a:rPr kumimoji="0" lang="en-US" sz="1800" b="0" i="0" u="none" strike="noStrike" kern="0" cap="none" spc="0" normalizeH="0" baseline="0" noProof="0" dirty="0">
+                  <a:ln>
+                    <a:noFill/>
+                  </a:ln>
+                  <a:solidFill>
+                    <a:srgbClr val="FFFFFF"/>
+                  </a:solidFill>
+                  <a:effectLst/>
+                  <a:uLnTx/>
+                  <a:uFillTx/>
+                  <a:latin typeface="Open sans"/>
+                  <a:ea typeface="+mn-ea"/>
+                  <a:cs typeface="+mn-cs"/>
+                </a:rPr>
+                <a:t>15</a:t>
+              </a:r>
+            </a:p>
+          </p:txBody>
+        </p:sp>
+        <p:sp>
+          <p:nvSpPr>
+            <p:cNvPr id="40" name="Rounded Rectangle 9">
+              <a:extLst>
+                <a:ext uri="{FF2B5EF4-FFF2-40B4-BE49-F238E27FC236}">
+                  <a16:creationId xmlns:a16="http://schemas.microsoft.com/office/drawing/2014/main" id="{2A38F8E5-A3B6-43A3-972F-A1757F06717B}"/>
+                </a:ext>
+              </a:extLst>
+            </p:cNvPr>
+            <p:cNvSpPr/>
+            <p:nvPr/>
+          </p:nvSpPr>
+          <p:spPr>
+            <a:xfrm>
+              <a:off x="5723302" y="1582884"/>
+              <a:ext cx="273269" cy="1007541"/>
+            </a:xfrm>
+            <a:prstGeom prst="roundRect">
+              <a:avLst/>
+            </a:prstGeom>
+            <a:solidFill>
+              <a:srgbClr val="2194CB"/>
+            </a:solidFill>
+            <a:ln w="12700" cap="flat" cmpd="sng" algn="ctr">
+              <a:solidFill>
+                <a:srgbClr val="2194CB">
+                  <a:shade val="50000"/>
+                </a:srgbClr>
+              </a:solidFill>
+              <a:prstDash val="solid"/>
+              <a:miter lim="800000"/>
+            </a:ln>
+            <a:effectLst/>
+          </p:spPr>
+          <p:txBody>
+            <a:bodyPr rtlCol="0" anchor="ctr"/>
+            <a:lstStyle/>
+            <a:p>
+              <a:pPr marL="0" marR="0" lvl="0" indent="0" algn="ctr" defTabSz="914400" eaLnBrk="1" fontAlgn="auto" latinLnBrk="0" hangingPunct="1">
+                <a:lnSpc>
+                  <a:spcPct val="100000"/>
+                </a:lnSpc>
+                <a:spcBef>
+                  <a:spcPts val="0"/>
+                </a:spcBef>
+                <a:spcAft>
+                  <a:spcPts val="0"/>
+                </a:spcAft>
+                <a:buClrTx/>
+                <a:buSzTx/>
+                <a:buFontTx/>
+                <a:buNone/>
+                <a:tabLst/>
+                <a:defRPr/>
+              </a:pPr>
+              <a:r>
+                <a:rPr kumimoji="0" lang="en-US" sz="1800" b="0" i="0" u="none" strike="noStrike" kern="0" cap="none" spc="0" normalizeH="0" baseline="0" noProof="0" dirty="0">
+                  <a:ln>
+                    <a:noFill/>
+                  </a:ln>
+                  <a:solidFill>
+                    <a:srgbClr val="FFFFFF"/>
+                  </a:solidFill>
+                  <a:effectLst/>
+                  <a:uLnTx/>
+                  <a:uFillTx/>
+                  <a:latin typeface="Open sans"/>
+                  <a:ea typeface="+mn-ea"/>
+                  <a:cs typeface="+mn-cs"/>
+                </a:rPr>
+                <a:t>16</a:t>
+              </a:r>
+            </a:p>
+          </p:txBody>
+        </p:sp>
+        <p:sp>
+          <p:nvSpPr>
+            <p:cNvPr id="41" name="Rounded Rectangle 13">
+              <a:extLst>
+                <a:ext uri="{FF2B5EF4-FFF2-40B4-BE49-F238E27FC236}">
+                  <a16:creationId xmlns:a16="http://schemas.microsoft.com/office/drawing/2014/main" id="{9D520858-63F3-4F13-A403-D66839B0895F}"/>
+                </a:ext>
+              </a:extLst>
+            </p:cNvPr>
+            <p:cNvSpPr/>
+            <p:nvPr/>
+          </p:nvSpPr>
+          <p:spPr>
+            <a:xfrm>
+              <a:off x="4463830" y="1577980"/>
+              <a:ext cx="273269" cy="1007541"/>
+            </a:xfrm>
+            <a:prstGeom prst="roundRect">
+              <a:avLst/>
+            </a:prstGeom>
+            <a:solidFill>
+              <a:srgbClr val="2194CB"/>
+            </a:solidFill>
+            <a:ln w="12700" cap="flat" cmpd="sng" algn="ctr">
+              <a:solidFill>
+                <a:srgbClr val="2194CB">
+                  <a:shade val="50000"/>
+                </a:srgbClr>
+              </a:solidFill>
+              <a:prstDash val="solid"/>
+              <a:miter lim="800000"/>
+            </a:ln>
+            <a:effectLst/>
+          </p:spPr>
+          <p:txBody>
+            <a:bodyPr rtlCol="0" anchor="ctr"/>
+            <a:lstStyle/>
+            <a:p>
+              <a:pPr marL="0" marR="0" lvl="0" indent="0" algn="ctr" defTabSz="914400" eaLnBrk="1" fontAlgn="auto" latinLnBrk="0" hangingPunct="1">
+                <a:lnSpc>
+                  <a:spcPct val="100000"/>
+                </a:lnSpc>
+                <a:spcBef>
+                  <a:spcPts val="0"/>
+                </a:spcBef>
+                <a:spcAft>
+                  <a:spcPts val="0"/>
+                </a:spcAft>
+                <a:buClrTx/>
+                <a:buSzTx/>
+                <a:buFontTx/>
+                <a:buNone/>
+                <a:tabLst/>
+                <a:defRPr/>
+              </a:pPr>
+              <a:r>
+                <a:rPr kumimoji="0" lang="en-US" sz="1800" b="0" i="0" u="none" strike="noStrike" kern="0" cap="none" spc="0" normalizeH="0" baseline="0" noProof="0" dirty="0">
+                  <a:ln>
+                    <a:noFill/>
+                  </a:ln>
+                  <a:solidFill>
+                    <a:srgbClr val="FFFFFF"/>
+                  </a:solidFill>
+                  <a:effectLst/>
+                  <a:uLnTx/>
+                  <a:uFillTx/>
+                  <a:latin typeface="Open sans"/>
+                  <a:ea typeface="+mn-ea"/>
+                  <a:cs typeface="+mn-cs"/>
+                </a:rPr>
+                <a:t>13</a:t>
+              </a:r>
+            </a:p>
+          </p:txBody>
+        </p:sp>
+        <p:sp>
+          <p:nvSpPr>
+            <p:cNvPr id="42" name="Rounded Rectangle 17">
+              <a:extLst>
+                <a:ext uri="{FF2B5EF4-FFF2-40B4-BE49-F238E27FC236}">
+                  <a16:creationId xmlns:a16="http://schemas.microsoft.com/office/drawing/2014/main" id="{F38968F6-7C02-4D22-8C11-3B06C9CAD7D2}"/>
+                </a:ext>
+              </a:extLst>
+            </p:cNvPr>
+            <p:cNvSpPr/>
+            <p:nvPr/>
+          </p:nvSpPr>
+          <p:spPr>
+            <a:xfrm>
+              <a:off x="3209487" y="1573075"/>
+              <a:ext cx="273269" cy="1007541"/>
+            </a:xfrm>
+            <a:prstGeom prst="roundRect">
+              <a:avLst/>
+            </a:prstGeom>
+            <a:solidFill>
+              <a:srgbClr val="2194CB"/>
+            </a:solidFill>
+            <a:ln w="12700" cap="flat" cmpd="sng" algn="ctr">
+              <a:solidFill>
+                <a:srgbClr val="2194CB">
+                  <a:shade val="50000"/>
+                </a:srgbClr>
+              </a:solidFill>
+              <a:prstDash val="solid"/>
+              <a:miter lim="800000"/>
+            </a:ln>
+            <a:effectLst/>
+          </p:spPr>
+          <p:txBody>
+            <a:bodyPr rtlCol="0" anchor="ctr"/>
+            <a:lstStyle/>
+            <a:p>
+              <a:pPr marL="0" marR="0" lvl="0" indent="0" algn="ctr" defTabSz="914400" eaLnBrk="1" fontAlgn="auto" latinLnBrk="0" hangingPunct="1">
+                <a:lnSpc>
+                  <a:spcPct val="100000"/>
+                </a:lnSpc>
+                <a:spcBef>
+                  <a:spcPts val="0"/>
+                </a:spcBef>
+                <a:spcAft>
+                  <a:spcPts val="0"/>
+                </a:spcAft>
+                <a:buClrTx/>
+                <a:buSzTx/>
+                <a:buFontTx/>
+                <a:buNone/>
+                <a:tabLst/>
+                <a:defRPr/>
+              </a:pPr>
+              <a:r>
+                <a:rPr kumimoji="0" lang="en-US" sz="1800" b="0" i="0" u="none" strike="noStrike" kern="0" cap="none" spc="0" normalizeH="0" baseline="0" noProof="0" dirty="0">
+                  <a:ln>
+                    <a:noFill/>
+                  </a:ln>
+                  <a:solidFill>
+                    <a:srgbClr val="FFFFFF"/>
+                  </a:solidFill>
+                  <a:effectLst/>
+                  <a:uLnTx/>
+                  <a:uFillTx/>
+                  <a:latin typeface="Open sans"/>
+                  <a:ea typeface="+mn-ea"/>
+                  <a:cs typeface="+mn-cs"/>
+                </a:rPr>
+                <a:t>10</a:t>
+              </a:r>
+            </a:p>
+          </p:txBody>
+        </p:sp>
+        <p:sp>
+          <p:nvSpPr>
+            <p:cNvPr id="43" name="Rounded Rectangle 19">
+              <a:extLst>
+                <a:ext uri="{FF2B5EF4-FFF2-40B4-BE49-F238E27FC236}">
+                  <a16:creationId xmlns:a16="http://schemas.microsoft.com/office/drawing/2014/main" id="{8C213CE6-90A0-4D94-BB08-65C599721C7A}"/>
+                </a:ext>
+              </a:extLst>
+            </p:cNvPr>
+            <p:cNvSpPr/>
+            <p:nvPr/>
+          </p:nvSpPr>
+          <p:spPr>
+            <a:xfrm>
+              <a:off x="3629354" y="1573075"/>
+              <a:ext cx="273269" cy="1007541"/>
+            </a:xfrm>
+            <a:prstGeom prst="roundRect">
+              <a:avLst/>
+            </a:prstGeom>
+            <a:solidFill>
+              <a:srgbClr val="2194CB"/>
+            </a:solidFill>
+            <a:ln w="12700" cap="flat" cmpd="sng" algn="ctr">
+              <a:solidFill>
+                <a:srgbClr val="2194CB">
+                  <a:shade val="50000"/>
+                </a:srgbClr>
+              </a:solidFill>
+              <a:prstDash val="solid"/>
+              <a:miter lim="800000"/>
+            </a:ln>
+            <a:effectLst/>
+          </p:spPr>
+          <p:txBody>
+            <a:bodyPr rtlCol="0" anchor="ctr"/>
+            <a:lstStyle/>
+            <a:p>
+              <a:pPr marL="0" marR="0" lvl="0" indent="0" algn="ctr" defTabSz="914400" eaLnBrk="1" fontAlgn="auto" latinLnBrk="0" hangingPunct="1">
+                <a:lnSpc>
+                  <a:spcPct val="100000"/>
+                </a:lnSpc>
+                <a:spcBef>
+                  <a:spcPts val="0"/>
+                </a:spcBef>
+                <a:spcAft>
+                  <a:spcPts val="0"/>
+                </a:spcAft>
+                <a:buClrTx/>
+                <a:buSzTx/>
+                <a:buFontTx/>
+                <a:buNone/>
+                <a:tabLst/>
+                <a:defRPr/>
+              </a:pPr>
+              <a:r>
+                <a:rPr kumimoji="0" lang="en-US" sz="1800" b="0" i="0" u="none" strike="noStrike" kern="0" cap="none" spc="0" normalizeH="0" baseline="0" noProof="0" dirty="0">
+                  <a:ln>
+                    <a:noFill/>
+                  </a:ln>
+                  <a:solidFill>
+                    <a:srgbClr val="FFFFFF"/>
+                  </a:solidFill>
+                  <a:effectLst/>
+                  <a:uLnTx/>
+                  <a:uFillTx/>
+                  <a:latin typeface="Open sans"/>
+                  <a:ea typeface="+mn-ea"/>
+                  <a:cs typeface="+mn-cs"/>
+                </a:rPr>
+                <a:t>11</a:t>
+              </a:r>
+            </a:p>
+          </p:txBody>
+        </p:sp>
+        <p:sp>
+          <p:nvSpPr>
+            <p:cNvPr id="44" name="Rounded Rectangle 21">
+              <a:extLst>
+                <a:ext uri="{FF2B5EF4-FFF2-40B4-BE49-F238E27FC236}">
+                  <a16:creationId xmlns:a16="http://schemas.microsoft.com/office/drawing/2014/main" id="{35CFB4BF-18B0-4B8B-B2B5-03A0FA42EED3}"/>
+                </a:ext>
+              </a:extLst>
+            </p:cNvPr>
+            <p:cNvSpPr/>
+            <p:nvPr/>
+          </p:nvSpPr>
+          <p:spPr>
+            <a:xfrm>
+              <a:off x="4049092" y="1577979"/>
+              <a:ext cx="273269" cy="1007541"/>
+            </a:xfrm>
+            <a:prstGeom prst="roundRect">
+              <a:avLst/>
+            </a:prstGeom>
+            <a:solidFill>
+              <a:srgbClr val="2194CB"/>
+            </a:solidFill>
+            <a:ln w="12700" cap="flat" cmpd="sng" algn="ctr">
+              <a:solidFill>
+                <a:srgbClr val="2194CB">
+                  <a:shade val="50000"/>
+                </a:srgbClr>
+              </a:solidFill>
+              <a:prstDash val="solid"/>
+              <a:miter lim="800000"/>
+            </a:ln>
+            <a:effectLst/>
+          </p:spPr>
+          <p:txBody>
+            <a:bodyPr rtlCol="0" anchor="ctr"/>
+            <a:lstStyle/>
+            <a:p>
+              <a:pPr marL="0" marR="0" lvl="0" indent="0" algn="ctr" defTabSz="914400" eaLnBrk="1" fontAlgn="auto" latinLnBrk="0" hangingPunct="1">
+                <a:lnSpc>
+                  <a:spcPct val="100000"/>
+                </a:lnSpc>
+                <a:spcBef>
+                  <a:spcPts val="0"/>
+                </a:spcBef>
+                <a:spcAft>
+                  <a:spcPts val="0"/>
+                </a:spcAft>
+                <a:buClrTx/>
+                <a:buSzTx/>
+                <a:buFontTx/>
+                <a:buNone/>
+                <a:tabLst/>
+                <a:defRPr/>
+              </a:pPr>
+              <a:r>
+                <a:rPr kumimoji="0" lang="en-US" sz="1800" b="0" i="0" u="none" strike="noStrike" kern="0" cap="none" spc="0" normalizeH="0" baseline="0" noProof="0" dirty="0">
+                  <a:ln>
+                    <a:noFill/>
+                  </a:ln>
+                  <a:solidFill>
+                    <a:srgbClr val="FFFFFF"/>
+                  </a:solidFill>
+                  <a:effectLst/>
+                  <a:uLnTx/>
+                  <a:uFillTx/>
+                  <a:latin typeface="Open sans"/>
+                  <a:ea typeface="+mn-ea"/>
+                  <a:cs typeface="+mn-cs"/>
+                </a:rPr>
+                <a:t>12</a:t>
+              </a:r>
+            </a:p>
+          </p:txBody>
+        </p:sp>
+        <p:sp>
+          <p:nvSpPr>
+            <p:cNvPr id="45" name="Rounded Rectangle 25">
+              <a:extLst>
+                <a:ext uri="{FF2B5EF4-FFF2-40B4-BE49-F238E27FC236}">
+                  <a16:creationId xmlns:a16="http://schemas.microsoft.com/office/drawing/2014/main" id="{5C7AED31-AF26-4C61-8246-6044A9E4B725}"/>
+                </a:ext>
+              </a:extLst>
+            </p:cNvPr>
+            <p:cNvSpPr/>
+            <p:nvPr/>
+          </p:nvSpPr>
+          <p:spPr>
+            <a:xfrm>
+              <a:off x="2789620" y="1573075"/>
+              <a:ext cx="273269" cy="1007541"/>
+            </a:xfrm>
+            <a:prstGeom prst="roundRect">
+              <a:avLst/>
+            </a:prstGeom>
+            <a:solidFill>
+              <a:srgbClr val="2194CB"/>
+            </a:solidFill>
+            <a:ln w="12700" cap="flat" cmpd="sng" algn="ctr">
+              <a:solidFill>
+                <a:srgbClr val="2194CB">
+                  <a:shade val="50000"/>
+                </a:srgbClr>
+              </a:solidFill>
+              <a:prstDash val="solid"/>
+              <a:miter lim="800000"/>
+            </a:ln>
+            <a:effectLst/>
+          </p:spPr>
+          <p:txBody>
+            <a:bodyPr rtlCol="0" anchor="ctr"/>
+            <a:lstStyle/>
+            <a:p>
+              <a:pPr marL="0" marR="0" lvl="0" indent="0" algn="ctr" defTabSz="914400" eaLnBrk="1" fontAlgn="auto" latinLnBrk="0" hangingPunct="1">
+                <a:lnSpc>
+                  <a:spcPct val="100000"/>
+                </a:lnSpc>
+                <a:spcBef>
+                  <a:spcPts val="0"/>
+                </a:spcBef>
+                <a:spcAft>
+                  <a:spcPts val="0"/>
+                </a:spcAft>
+                <a:buClrTx/>
+                <a:buSzTx/>
+                <a:buFontTx/>
+                <a:buNone/>
+                <a:tabLst/>
+                <a:defRPr/>
+              </a:pPr>
+              <a:r>
+                <a:rPr kumimoji="0" lang="en-US" sz="1800" b="0" i="0" u="none" strike="noStrike" kern="0" cap="none" spc="0" normalizeH="0" baseline="0" noProof="0" dirty="0">
+                  <a:ln>
+                    <a:noFill/>
+                  </a:ln>
+                  <a:solidFill>
+                    <a:srgbClr val="FFFFFF"/>
+                  </a:solidFill>
+                  <a:effectLst/>
+                  <a:uLnTx/>
+                  <a:uFillTx/>
+                  <a:latin typeface="Open sans"/>
+                  <a:ea typeface="+mn-ea"/>
+                  <a:cs typeface="+mn-cs"/>
+                </a:rPr>
+                <a:t>9</a:t>
+              </a:r>
+            </a:p>
+          </p:txBody>
+        </p:sp>
+        <p:sp>
+          <p:nvSpPr>
+            <p:cNvPr id="46" name="Rounded Rectangle 47">
+              <a:extLst>
+                <a:ext uri="{FF2B5EF4-FFF2-40B4-BE49-F238E27FC236}">
+                  <a16:creationId xmlns:a16="http://schemas.microsoft.com/office/drawing/2014/main" id="{172241C1-14DD-4405-9FEC-630681B80CDD}"/>
+                </a:ext>
+              </a:extLst>
+            </p:cNvPr>
+            <p:cNvSpPr/>
+            <p:nvPr/>
+          </p:nvSpPr>
+          <p:spPr>
+            <a:xfrm>
+              <a:off x="1535277" y="1568170"/>
+              <a:ext cx="273269" cy="1007541"/>
+            </a:xfrm>
+            <a:prstGeom prst="roundRect">
+              <a:avLst/>
+            </a:prstGeom>
+            <a:solidFill>
+              <a:srgbClr val="2194CB"/>
+            </a:solidFill>
+            <a:ln w="12700" cap="flat" cmpd="sng" algn="ctr">
+              <a:solidFill>
+                <a:srgbClr val="2194CB">
+                  <a:shade val="50000"/>
+                </a:srgbClr>
+              </a:solidFill>
+              <a:prstDash val="solid"/>
+              <a:miter lim="800000"/>
+            </a:ln>
+            <a:effectLst/>
+          </p:spPr>
+          <p:txBody>
+            <a:bodyPr rtlCol="0" anchor="ctr"/>
+            <a:lstStyle/>
+            <a:p>
+              <a:pPr marL="0" marR="0" lvl="0" indent="0" algn="ctr" defTabSz="914400" eaLnBrk="1" fontAlgn="auto" latinLnBrk="0" hangingPunct="1">
+                <a:lnSpc>
+                  <a:spcPct val="100000"/>
+                </a:lnSpc>
+                <a:spcBef>
+                  <a:spcPts val="0"/>
+                </a:spcBef>
+                <a:spcAft>
+                  <a:spcPts val="0"/>
+                </a:spcAft>
+                <a:buClrTx/>
+                <a:buSzTx/>
+                <a:buFontTx/>
+                <a:buNone/>
+                <a:tabLst/>
+                <a:defRPr/>
+              </a:pPr>
+              <a:r>
+                <a:rPr kumimoji="0" lang="en-US" sz="1800" b="0" i="0" u="none" strike="noStrike" kern="0" cap="none" spc="0" normalizeH="0" baseline="0" noProof="0" dirty="0">
+                  <a:ln>
+                    <a:noFill/>
+                  </a:ln>
+                  <a:solidFill>
+                    <a:srgbClr val="FFFFFF"/>
+                  </a:solidFill>
+                  <a:effectLst/>
+                  <a:uLnTx/>
+                  <a:uFillTx/>
+                  <a:latin typeface="Open sans"/>
+                  <a:ea typeface="+mn-ea"/>
+                  <a:cs typeface="+mn-cs"/>
+                </a:rPr>
+                <a:t>6</a:t>
+              </a:r>
+            </a:p>
+          </p:txBody>
+        </p:sp>
+        <p:sp>
+          <p:nvSpPr>
+            <p:cNvPr id="47" name="Rounded Rectangle 49">
+              <a:extLst>
+                <a:ext uri="{FF2B5EF4-FFF2-40B4-BE49-F238E27FC236}">
+                  <a16:creationId xmlns:a16="http://schemas.microsoft.com/office/drawing/2014/main" id="{4FB7F429-603E-4336-98CB-A22D14F4D24C}"/>
+                </a:ext>
+              </a:extLst>
+            </p:cNvPr>
+            <p:cNvSpPr/>
+            <p:nvPr/>
+          </p:nvSpPr>
+          <p:spPr>
+            <a:xfrm>
+              <a:off x="1955144" y="1568170"/>
+              <a:ext cx="273269" cy="1007541"/>
+            </a:xfrm>
+            <a:prstGeom prst="roundRect">
+              <a:avLst/>
+            </a:prstGeom>
+            <a:solidFill>
+              <a:srgbClr val="2194CB"/>
+            </a:solidFill>
+            <a:ln w="12700" cap="flat" cmpd="sng" algn="ctr">
+              <a:solidFill>
+                <a:srgbClr val="2194CB">
+                  <a:shade val="50000"/>
+                </a:srgbClr>
+              </a:solidFill>
+              <a:prstDash val="solid"/>
+              <a:miter lim="800000"/>
+            </a:ln>
+            <a:effectLst/>
+          </p:spPr>
+          <p:txBody>
+            <a:bodyPr rtlCol="0" anchor="ctr"/>
+            <a:lstStyle/>
+            <a:p>
+              <a:pPr marL="0" marR="0" lvl="0" indent="0" algn="ctr" defTabSz="914400" eaLnBrk="1" fontAlgn="auto" latinLnBrk="0" hangingPunct="1">
+                <a:lnSpc>
+                  <a:spcPct val="100000"/>
+                </a:lnSpc>
+                <a:spcBef>
+                  <a:spcPts val="0"/>
+                </a:spcBef>
+                <a:spcAft>
+                  <a:spcPts val="0"/>
+                </a:spcAft>
+                <a:buClrTx/>
+                <a:buSzTx/>
+                <a:buFontTx/>
+                <a:buNone/>
+                <a:tabLst/>
+                <a:defRPr/>
+              </a:pPr>
+              <a:r>
+                <a:rPr kumimoji="0" lang="en-US" sz="1800" b="0" i="0" u="none" strike="noStrike" kern="0" cap="none" spc="0" normalizeH="0" baseline="0" noProof="0" dirty="0">
+                  <a:ln>
+                    <a:noFill/>
+                  </a:ln>
+                  <a:solidFill>
+                    <a:srgbClr val="FFFFFF"/>
+                  </a:solidFill>
+                  <a:effectLst/>
+                  <a:uLnTx/>
+                  <a:uFillTx/>
+                  <a:latin typeface="Open sans"/>
+                  <a:ea typeface="+mn-ea"/>
+                  <a:cs typeface="+mn-cs"/>
+                </a:rPr>
+                <a:t>7</a:t>
+              </a:r>
+            </a:p>
+          </p:txBody>
+        </p:sp>
+        <p:sp>
+          <p:nvSpPr>
+            <p:cNvPr id="48" name="Rounded Rectangle 51">
+              <a:extLst>
+                <a:ext uri="{FF2B5EF4-FFF2-40B4-BE49-F238E27FC236}">
+                  <a16:creationId xmlns:a16="http://schemas.microsoft.com/office/drawing/2014/main" id="{EB034CA9-539F-4EC8-8ECD-156E526CF6B1}"/>
+                </a:ext>
+              </a:extLst>
+            </p:cNvPr>
+            <p:cNvSpPr/>
+            <p:nvPr/>
+          </p:nvSpPr>
+          <p:spPr>
+            <a:xfrm>
+              <a:off x="2374882" y="1573074"/>
+              <a:ext cx="273269" cy="1007541"/>
+            </a:xfrm>
+            <a:prstGeom prst="roundRect">
+              <a:avLst/>
+            </a:prstGeom>
+            <a:solidFill>
+              <a:srgbClr val="2194CB"/>
+            </a:solidFill>
+            <a:ln w="12700" cap="flat" cmpd="sng" algn="ctr">
+              <a:solidFill>
+                <a:srgbClr val="2194CB">
+                  <a:shade val="50000"/>
+                </a:srgbClr>
+              </a:solidFill>
+              <a:prstDash val="solid"/>
+              <a:miter lim="800000"/>
+            </a:ln>
+            <a:effectLst/>
+          </p:spPr>
+          <p:txBody>
+            <a:bodyPr rtlCol="0" anchor="ctr"/>
+            <a:lstStyle/>
+            <a:p>
+              <a:pPr marL="0" marR="0" lvl="0" indent="0" algn="ctr" defTabSz="914400" eaLnBrk="1" fontAlgn="auto" latinLnBrk="0" hangingPunct="1">
+                <a:lnSpc>
+                  <a:spcPct val="100000"/>
+                </a:lnSpc>
+                <a:spcBef>
+                  <a:spcPts val="0"/>
+                </a:spcBef>
+                <a:spcAft>
+                  <a:spcPts val="0"/>
+                </a:spcAft>
+                <a:buClrTx/>
+                <a:buSzTx/>
+                <a:buFontTx/>
+                <a:buNone/>
+                <a:tabLst/>
+                <a:defRPr/>
+              </a:pPr>
+              <a:r>
+                <a:rPr kumimoji="0" lang="en-US" sz="1800" b="0" i="0" u="none" strike="noStrike" kern="0" cap="none" spc="0" normalizeH="0" baseline="0" noProof="0" dirty="0">
+                  <a:ln>
+                    <a:noFill/>
+                  </a:ln>
+                  <a:solidFill>
+                    <a:srgbClr val="FFFFFF"/>
+                  </a:solidFill>
+                  <a:effectLst/>
+                  <a:uLnTx/>
+                  <a:uFillTx/>
+                  <a:latin typeface="Open sans"/>
+                  <a:ea typeface="+mn-ea"/>
+                  <a:cs typeface="+mn-cs"/>
+                </a:rPr>
+                <a:t>8</a:t>
+              </a:r>
+            </a:p>
+          </p:txBody>
+        </p:sp>
+        <p:sp>
+          <p:nvSpPr>
+            <p:cNvPr id="49" name="Rounded Rectangle 53">
+              <a:extLst>
+                <a:ext uri="{FF2B5EF4-FFF2-40B4-BE49-F238E27FC236}">
+                  <a16:creationId xmlns:a16="http://schemas.microsoft.com/office/drawing/2014/main" id="{70B09830-C979-4B83-875F-553FB2F50DDF}"/>
+                </a:ext>
+              </a:extLst>
+            </p:cNvPr>
+            <p:cNvSpPr/>
+            <p:nvPr/>
+          </p:nvSpPr>
+          <p:spPr>
+            <a:xfrm>
+              <a:off x="1115410" y="1568170"/>
+              <a:ext cx="273269" cy="1007541"/>
+            </a:xfrm>
+            <a:prstGeom prst="roundRect">
+              <a:avLst/>
+            </a:prstGeom>
+            <a:solidFill>
+              <a:srgbClr val="2194CB"/>
+            </a:solidFill>
+            <a:ln w="12700" cap="flat" cmpd="sng" algn="ctr">
+              <a:solidFill>
+                <a:srgbClr val="2194CB">
+                  <a:shade val="50000"/>
+                </a:srgbClr>
+              </a:solidFill>
+              <a:prstDash val="solid"/>
+              <a:miter lim="800000"/>
+            </a:ln>
+            <a:effectLst/>
+          </p:spPr>
+          <p:txBody>
+            <a:bodyPr rtlCol="0" anchor="ctr"/>
+            <a:lstStyle/>
+            <a:p>
+              <a:pPr marL="0" marR="0" lvl="0" indent="0" algn="ctr" defTabSz="914400" eaLnBrk="1" fontAlgn="auto" latinLnBrk="0" hangingPunct="1">
+                <a:lnSpc>
+                  <a:spcPct val="100000"/>
+                </a:lnSpc>
+                <a:spcBef>
+                  <a:spcPts val="0"/>
+                </a:spcBef>
+                <a:spcAft>
+                  <a:spcPts val="0"/>
+                </a:spcAft>
+                <a:buClrTx/>
+                <a:buSzTx/>
+                <a:buFontTx/>
+                <a:buNone/>
+                <a:tabLst/>
+                <a:defRPr/>
+              </a:pPr>
+              <a:r>
+                <a:rPr kumimoji="0" lang="en-US" sz="1800" b="0" i="0" u="none" strike="noStrike" kern="0" cap="none" spc="0" normalizeH="0" baseline="0" noProof="0" dirty="0">
+                  <a:ln>
+                    <a:noFill/>
+                  </a:ln>
+                  <a:solidFill>
+                    <a:srgbClr val="FFFFFF"/>
+                  </a:solidFill>
+                  <a:effectLst/>
+                  <a:uLnTx/>
+                  <a:uFillTx/>
+                  <a:latin typeface="Open sans"/>
+                  <a:ea typeface="+mn-ea"/>
+                  <a:cs typeface="+mn-cs"/>
+                </a:rPr>
+                <a:t>5</a:t>
+              </a:r>
+            </a:p>
+          </p:txBody>
+        </p:sp>
+        <p:sp>
+          <p:nvSpPr>
+            <p:cNvPr id="50" name="Rounded Rectangle 55">
+              <a:extLst>
+                <a:ext uri="{FF2B5EF4-FFF2-40B4-BE49-F238E27FC236}">
+                  <a16:creationId xmlns:a16="http://schemas.microsoft.com/office/drawing/2014/main" id="{5643C346-1EA7-41C3-B0AE-A39E27E28520}"/>
+                </a:ext>
+              </a:extLst>
+            </p:cNvPr>
+            <p:cNvSpPr/>
+            <p:nvPr/>
+          </p:nvSpPr>
+          <p:spPr>
+            <a:xfrm>
+              <a:off x="-138933" y="1563265"/>
+              <a:ext cx="273269" cy="1007541"/>
+            </a:xfrm>
+            <a:prstGeom prst="roundRect">
+              <a:avLst/>
+            </a:prstGeom>
+            <a:solidFill>
+              <a:srgbClr val="2194CB"/>
+            </a:solidFill>
+            <a:ln w="12700" cap="flat" cmpd="sng" algn="ctr">
+              <a:solidFill>
+                <a:srgbClr val="2194CB">
+                  <a:shade val="50000"/>
+                </a:srgbClr>
+              </a:solidFill>
+              <a:prstDash val="solid"/>
+              <a:miter lim="800000"/>
+            </a:ln>
+            <a:effectLst/>
+          </p:spPr>
+          <p:txBody>
+            <a:bodyPr rtlCol="0" anchor="ctr"/>
+            <a:lstStyle/>
+            <a:p>
+              <a:pPr marL="0" marR="0" lvl="0" indent="0" algn="ctr" defTabSz="914400" eaLnBrk="1" fontAlgn="auto" latinLnBrk="0" hangingPunct="1">
+                <a:lnSpc>
+                  <a:spcPct val="100000"/>
+                </a:lnSpc>
+                <a:spcBef>
+                  <a:spcPts val="0"/>
+                </a:spcBef>
+                <a:spcAft>
+                  <a:spcPts val="0"/>
+                </a:spcAft>
+                <a:buClrTx/>
+                <a:buSzTx/>
+                <a:buFontTx/>
+                <a:buNone/>
+                <a:tabLst/>
+                <a:defRPr/>
+              </a:pPr>
+              <a:r>
+                <a:rPr kumimoji="0" lang="en-US" sz="1800" b="0" i="0" u="none" strike="noStrike" kern="0" cap="none" spc="0" normalizeH="0" baseline="0" noProof="0" dirty="0">
+                  <a:ln>
+                    <a:noFill/>
+                  </a:ln>
+                  <a:solidFill>
+                    <a:srgbClr val="FFFFFF"/>
+                  </a:solidFill>
+                  <a:effectLst/>
+                  <a:uLnTx/>
+                  <a:uFillTx/>
+                  <a:latin typeface="Open sans"/>
+                  <a:ea typeface="+mn-ea"/>
+                  <a:cs typeface="+mn-cs"/>
+                </a:rPr>
+                <a:t>2</a:t>
+              </a:r>
+            </a:p>
+          </p:txBody>
+        </p:sp>
+        <p:sp>
+          <p:nvSpPr>
+            <p:cNvPr id="51" name="Rounded Rectangle 57">
+              <a:extLst>
+                <a:ext uri="{FF2B5EF4-FFF2-40B4-BE49-F238E27FC236}">
+                  <a16:creationId xmlns:a16="http://schemas.microsoft.com/office/drawing/2014/main" id="{C9DA1842-8302-46C9-B877-C00440FF0D25}"/>
+                </a:ext>
+              </a:extLst>
+            </p:cNvPr>
+            <p:cNvSpPr/>
+            <p:nvPr/>
+          </p:nvSpPr>
+          <p:spPr>
+            <a:xfrm>
+              <a:off x="280934" y="1563265"/>
+              <a:ext cx="273269" cy="1007541"/>
+            </a:xfrm>
+            <a:prstGeom prst="roundRect">
+              <a:avLst/>
+            </a:prstGeom>
+            <a:solidFill>
+              <a:srgbClr val="2194CB"/>
+            </a:solidFill>
+            <a:ln w="12700" cap="flat" cmpd="sng" algn="ctr">
+              <a:solidFill>
+                <a:srgbClr val="2194CB">
+                  <a:shade val="50000"/>
+                </a:srgbClr>
+              </a:solidFill>
+              <a:prstDash val="solid"/>
+              <a:miter lim="800000"/>
+            </a:ln>
+            <a:effectLst/>
+          </p:spPr>
+          <p:txBody>
+            <a:bodyPr rtlCol="0" anchor="ctr"/>
+            <a:lstStyle/>
+            <a:p>
+              <a:pPr marL="0" marR="0" lvl="0" indent="0" algn="ctr" defTabSz="914400" eaLnBrk="1" fontAlgn="auto" latinLnBrk="0" hangingPunct="1">
+                <a:lnSpc>
+                  <a:spcPct val="100000"/>
+                </a:lnSpc>
+                <a:spcBef>
+                  <a:spcPts val="0"/>
+                </a:spcBef>
+                <a:spcAft>
+                  <a:spcPts val="0"/>
+                </a:spcAft>
+                <a:buClrTx/>
+                <a:buSzTx/>
+                <a:buFontTx/>
+                <a:buNone/>
+                <a:tabLst/>
+                <a:defRPr/>
+              </a:pPr>
+              <a:r>
+                <a:rPr kumimoji="0" lang="en-US" sz="1800" b="0" i="0" u="none" strike="noStrike" kern="0" cap="none" spc="0" normalizeH="0" baseline="0" noProof="0" dirty="0">
+                  <a:ln>
+                    <a:noFill/>
+                  </a:ln>
+                  <a:solidFill>
+                    <a:srgbClr val="FFFFFF"/>
+                  </a:solidFill>
+                  <a:effectLst/>
+                  <a:uLnTx/>
+                  <a:uFillTx/>
+                  <a:latin typeface="Open sans"/>
+                  <a:ea typeface="+mn-ea"/>
+                  <a:cs typeface="+mn-cs"/>
+                </a:rPr>
+                <a:t>3</a:t>
+              </a:r>
+            </a:p>
+          </p:txBody>
+        </p:sp>
+        <p:sp>
+          <p:nvSpPr>
+            <p:cNvPr id="52" name="Rounded Rectangle 59">
+              <a:extLst>
+                <a:ext uri="{FF2B5EF4-FFF2-40B4-BE49-F238E27FC236}">
+                  <a16:creationId xmlns:a16="http://schemas.microsoft.com/office/drawing/2014/main" id="{587B6953-4BDB-4F84-8F3E-64EEB4DCE88D}"/>
+                </a:ext>
+              </a:extLst>
+            </p:cNvPr>
+            <p:cNvSpPr/>
+            <p:nvPr/>
+          </p:nvSpPr>
+          <p:spPr>
+            <a:xfrm>
+              <a:off x="700672" y="1568169"/>
+              <a:ext cx="273269" cy="1007541"/>
+            </a:xfrm>
+            <a:prstGeom prst="roundRect">
+              <a:avLst/>
+            </a:prstGeom>
+            <a:solidFill>
+              <a:srgbClr val="2194CB"/>
+            </a:solidFill>
+            <a:ln w="12700" cap="flat" cmpd="sng" algn="ctr">
+              <a:solidFill>
+                <a:srgbClr val="2194CB">
+                  <a:shade val="50000"/>
+                </a:srgbClr>
+              </a:solidFill>
+              <a:prstDash val="solid"/>
+              <a:miter lim="800000"/>
+            </a:ln>
+            <a:effectLst/>
+          </p:spPr>
+          <p:txBody>
+            <a:bodyPr rtlCol="0" anchor="ctr"/>
+            <a:lstStyle/>
+            <a:p>
+              <a:pPr marL="0" marR="0" lvl="0" indent="0" algn="ctr" defTabSz="914400" eaLnBrk="1" fontAlgn="auto" latinLnBrk="0" hangingPunct="1">
+                <a:lnSpc>
+                  <a:spcPct val="100000"/>
+                </a:lnSpc>
+                <a:spcBef>
+                  <a:spcPts val="0"/>
+                </a:spcBef>
+                <a:spcAft>
+                  <a:spcPts val="0"/>
+                </a:spcAft>
+                <a:buClrTx/>
+                <a:buSzTx/>
+                <a:buFontTx/>
+                <a:buNone/>
+                <a:tabLst/>
+                <a:defRPr/>
+              </a:pPr>
+              <a:r>
+                <a:rPr kumimoji="0" lang="en-US" sz="1800" b="0" i="0" u="none" strike="noStrike" kern="0" cap="none" spc="0" normalizeH="0" baseline="0" noProof="0" dirty="0">
+                  <a:ln>
+                    <a:noFill/>
+                  </a:ln>
+                  <a:solidFill>
+                    <a:srgbClr val="FFFFFF"/>
+                  </a:solidFill>
+                  <a:effectLst/>
+                  <a:uLnTx/>
+                  <a:uFillTx/>
+                  <a:latin typeface="Open sans"/>
+                  <a:ea typeface="+mn-ea"/>
+                  <a:cs typeface="+mn-cs"/>
+                </a:rPr>
+                <a:t>4</a:t>
+              </a:r>
+            </a:p>
+          </p:txBody>
+        </p:sp>
+        <p:sp>
+          <p:nvSpPr>
+            <p:cNvPr id="53" name="Rounded Rectangle 61">
+              <a:extLst>
+                <a:ext uri="{FF2B5EF4-FFF2-40B4-BE49-F238E27FC236}">
+                  <a16:creationId xmlns:a16="http://schemas.microsoft.com/office/drawing/2014/main" id="{0C534F96-9E7D-47F3-8A20-555624B51EF0}"/>
+                </a:ext>
+              </a:extLst>
+            </p:cNvPr>
+            <p:cNvSpPr/>
+            <p:nvPr/>
+          </p:nvSpPr>
+          <p:spPr>
+            <a:xfrm>
+              <a:off x="-969852" y="1553917"/>
+              <a:ext cx="273269" cy="1007541"/>
+            </a:xfrm>
+            <a:prstGeom prst="roundRect">
+              <a:avLst/>
+            </a:prstGeom>
+            <a:solidFill>
+              <a:srgbClr val="2194CB"/>
+            </a:solidFill>
+            <a:ln w="12700" cap="flat" cmpd="sng" algn="ctr">
+              <a:solidFill>
+                <a:srgbClr val="2194CB">
+                  <a:shade val="50000"/>
+                </a:srgbClr>
+              </a:solidFill>
+              <a:prstDash val="solid"/>
+              <a:miter lim="800000"/>
+            </a:ln>
+            <a:effectLst/>
+          </p:spPr>
+          <p:txBody>
+            <a:bodyPr rtlCol="0" anchor="ctr"/>
+            <a:lstStyle/>
+            <a:p>
+              <a:pPr marL="0" marR="0" lvl="0" indent="0" algn="ctr" defTabSz="914400" eaLnBrk="1" fontAlgn="auto" latinLnBrk="0" hangingPunct="1">
+                <a:lnSpc>
+                  <a:spcPct val="100000"/>
+                </a:lnSpc>
+                <a:spcBef>
+                  <a:spcPts val="0"/>
+                </a:spcBef>
+                <a:spcAft>
+                  <a:spcPts val="0"/>
+                </a:spcAft>
+                <a:buClrTx/>
+                <a:buSzTx/>
+                <a:buFontTx/>
+                <a:buNone/>
+                <a:tabLst/>
+                <a:defRPr/>
+              </a:pPr>
+              <a:r>
+                <a:rPr kumimoji="0" lang="en-US" sz="1800" b="0" i="0" u="none" strike="noStrike" kern="0" cap="none" spc="0" normalizeH="0" baseline="0" noProof="0" dirty="0">
+                  <a:ln>
+                    <a:noFill/>
+                  </a:ln>
+                  <a:solidFill>
+                    <a:srgbClr val="FFFFFF"/>
+                  </a:solidFill>
+                  <a:effectLst/>
+                  <a:uLnTx/>
+                  <a:uFillTx/>
+                  <a:latin typeface="Open sans"/>
+                  <a:ea typeface="+mn-ea"/>
+                  <a:cs typeface="+mn-cs"/>
+                </a:rPr>
+                <a:t>0</a:t>
+              </a:r>
+            </a:p>
+          </p:txBody>
+        </p:sp>
+        <p:sp>
+          <p:nvSpPr>
+            <p:cNvPr id="54" name="Rounded Rectangle 63">
+              <a:extLst>
+                <a:ext uri="{FF2B5EF4-FFF2-40B4-BE49-F238E27FC236}">
+                  <a16:creationId xmlns:a16="http://schemas.microsoft.com/office/drawing/2014/main" id="{A86C2BC1-8D72-44F4-B576-14EA77ABABA5}"/>
+                </a:ext>
+              </a:extLst>
+            </p:cNvPr>
+            <p:cNvSpPr/>
+            <p:nvPr/>
+          </p:nvSpPr>
+          <p:spPr>
+            <a:xfrm>
+              <a:off x="-549985" y="1553917"/>
+              <a:ext cx="273269" cy="1007541"/>
+            </a:xfrm>
+            <a:prstGeom prst="roundRect">
+              <a:avLst/>
+            </a:prstGeom>
+            <a:solidFill>
+              <a:srgbClr val="2194CB"/>
+            </a:solidFill>
+            <a:ln w="12700" cap="flat" cmpd="sng" algn="ctr">
+              <a:solidFill>
+                <a:srgbClr val="2194CB">
+                  <a:shade val="50000"/>
+                </a:srgbClr>
+              </a:solidFill>
+              <a:prstDash val="solid"/>
+              <a:miter lim="800000"/>
+            </a:ln>
+            <a:effectLst/>
+          </p:spPr>
+          <p:txBody>
+            <a:bodyPr rtlCol="0" anchor="ctr"/>
+            <a:lstStyle/>
+            <a:p>
+              <a:pPr marL="0" marR="0" lvl="0" indent="0" algn="ctr" defTabSz="914400" eaLnBrk="1" fontAlgn="auto" latinLnBrk="0" hangingPunct="1">
+                <a:lnSpc>
+                  <a:spcPct val="100000"/>
+                </a:lnSpc>
+                <a:spcBef>
+                  <a:spcPts val="0"/>
+                </a:spcBef>
+                <a:spcAft>
+                  <a:spcPts val="0"/>
+                </a:spcAft>
+                <a:buClrTx/>
+                <a:buSzTx/>
+                <a:buFontTx/>
+                <a:buNone/>
+                <a:tabLst/>
+                <a:defRPr/>
+              </a:pPr>
+              <a:r>
+                <a:rPr kumimoji="0" lang="en-US" sz="1800" b="0" i="0" u="none" strike="noStrike" kern="0" cap="none" spc="0" normalizeH="0" baseline="0" noProof="0" dirty="0">
+                  <a:ln>
+                    <a:noFill/>
+                  </a:ln>
+                  <a:solidFill>
+                    <a:srgbClr val="FFFFFF"/>
+                  </a:solidFill>
+                  <a:effectLst/>
+                  <a:uLnTx/>
+                  <a:uFillTx/>
+                  <a:latin typeface="Open sans"/>
+                  <a:ea typeface="+mn-ea"/>
+                  <a:cs typeface="+mn-cs"/>
+                </a:rPr>
+                <a:t>1</a:t>
+              </a:r>
+            </a:p>
+          </p:txBody>
+        </p:sp>
+      </p:grpSp>
+      <p:sp>
+        <p:nvSpPr>
+          <p:cNvPr id="55" name="Rounded Rectangle 142">
+            <a:extLst>
+              <a:ext uri="{FF2B5EF4-FFF2-40B4-BE49-F238E27FC236}">
+                <a16:creationId xmlns:a16="http://schemas.microsoft.com/office/drawing/2014/main" id="{3A7D1D04-6995-4D6B-88BE-266BFF3DC66F}"/>
+              </a:ext>
+            </a:extLst>
+          </p:cNvPr>
+          <p:cNvSpPr/>
+          <p:nvPr/>
+        </p:nvSpPr>
+        <p:spPr>
+          <a:xfrm>
+            <a:off x="2533735" y="4963251"/>
+            <a:ext cx="441434" cy="509087"/>
+          </a:xfrm>
+          <a:prstGeom prst="roundRect">
+            <a:avLst/>
+          </a:prstGeom>
+          <a:solidFill>
+            <a:srgbClr val="00B0F0"/>
+          </a:solidFill>
+          <a:ln w="12700" cap="flat" cmpd="sng" algn="ctr">
+            <a:solidFill>
+              <a:srgbClr val="335FDD"/>
+            </a:solidFill>
+            <a:prstDash val="solid"/>
+            <a:miter lim="800000"/>
+          </a:ln>
+          <a:effectLst/>
+        </p:spPr>
+        <p:txBody>
+          <a:bodyPr rtlCol="0" anchor="ctr"/>
+          <a:lstStyle/>
+          <a:p>
+            <a:pPr marL="0" marR="0" lvl="0" indent="0" algn="ctr" defTabSz="914400" eaLnBrk="1" fontAlgn="auto" latinLnBrk="0" hangingPunct="1">
+              <a:lnSpc>
+                <a:spcPct val="100000"/>
+              </a:lnSpc>
+              <a:spcBef>
+                <a:spcPts val="0"/>
+              </a:spcBef>
+              <a:spcAft>
+                <a:spcPts val="0"/>
+              </a:spcAft>
+              <a:buClrTx/>
+              <a:buSzTx/>
+              <a:buFontTx/>
+              <a:buNone/>
+              <a:tabLst/>
+              <a:defRPr/>
+            </a:pPr>
+            <a:r>
+              <a:rPr kumimoji="0" lang="en-US" sz="1100" b="0" i="0" u="none" strike="noStrike" kern="0" cap="none" spc="0" normalizeH="0" baseline="0" noProof="0" dirty="0">
+                <a:ln>
+                  <a:noFill/>
+                </a:ln>
+                <a:solidFill>
+                  <a:srgbClr val="FFFFFF"/>
+                </a:solidFill>
+                <a:effectLst/>
+                <a:uLnTx/>
+                <a:uFillTx/>
+                <a:latin typeface="Open sans"/>
+                <a:ea typeface="+mn-ea"/>
+                <a:cs typeface="+mn-cs"/>
+              </a:rPr>
+              <a:t>2K</a:t>
+            </a:r>
+          </a:p>
+        </p:txBody>
+      </p:sp>
+      <p:sp>
+        <p:nvSpPr>
+          <p:cNvPr id="56" name="Rounded Rectangle 144">
+            <a:extLst>
+              <a:ext uri="{FF2B5EF4-FFF2-40B4-BE49-F238E27FC236}">
+                <a16:creationId xmlns:a16="http://schemas.microsoft.com/office/drawing/2014/main" id="{96A85C33-B8C5-4DB5-AABF-3E4D3200B86B}"/>
+              </a:ext>
+            </a:extLst>
+          </p:cNvPr>
+          <p:cNvSpPr/>
+          <p:nvPr/>
+        </p:nvSpPr>
+        <p:spPr>
+          <a:xfrm>
+            <a:off x="709933" y="4957404"/>
+            <a:ext cx="441434" cy="509087"/>
+          </a:xfrm>
+          <a:prstGeom prst="roundRect">
+            <a:avLst/>
+          </a:prstGeom>
+          <a:solidFill>
+            <a:srgbClr val="00B0F0"/>
+          </a:solidFill>
+          <a:ln w="12700" cap="flat" cmpd="sng" algn="ctr">
+            <a:solidFill>
+              <a:srgbClr val="335FDD"/>
+            </a:solidFill>
+            <a:prstDash val="solid"/>
+            <a:miter lim="800000"/>
+          </a:ln>
+          <a:effectLst/>
+        </p:spPr>
+        <p:txBody>
+          <a:bodyPr rtlCol="0" anchor="ctr"/>
+          <a:lstStyle/>
+          <a:p>
+            <a:pPr marL="0" marR="0" lvl="0" indent="0" algn="ctr" defTabSz="914400" eaLnBrk="1" fontAlgn="auto" latinLnBrk="0" hangingPunct="1">
+              <a:lnSpc>
+                <a:spcPct val="100000"/>
+              </a:lnSpc>
+              <a:spcBef>
+                <a:spcPts val="0"/>
+              </a:spcBef>
+              <a:spcAft>
+                <a:spcPts val="0"/>
+              </a:spcAft>
+              <a:buClrTx/>
+              <a:buSzTx/>
+              <a:buFontTx/>
+              <a:buNone/>
+              <a:tabLst/>
+              <a:defRPr/>
+            </a:pPr>
+            <a:r>
+              <a:rPr kumimoji="0" lang="en-US" sz="1100" b="0" i="0" u="none" strike="noStrike" kern="0" cap="none" spc="0" normalizeH="0" baseline="0" noProof="0" dirty="0">
+                <a:ln>
+                  <a:noFill/>
+                </a:ln>
+                <a:solidFill>
+                  <a:srgbClr val="FFFFFF"/>
+                </a:solidFill>
+                <a:effectLst/>
+                <a:uLnTx/>
+                <a:uFillTx/>
+                <a:latin typeface="Open sans"/>
+                <a:ea typeface="+mn-ea"/>
+                <a:cs typeface="+mn-cs"/>
+              </a:rPr>
+              <a:t>2K</a:t>
+            </a:r>
+          </a:p>
+        </p:txBody>
+      </p:sp>
+      <p:sp>
+        <p:nvSpPr>
+          <p:cNvPr id="57" name="Rounded Rectangle 146">
+            <a:extLst>
+              <a:ext uri="{FF2B5EF4-FFF2-40B4-BE49-F238E27FC236}">
+                <a16:creationId xmlns:a16="http://schemas.microsoft.com/office/drawing/2014/main" id="{9129B418-F802-4394-B38D-C69DFF8B9229}"/>
+              </a:ext>
+            </a:extLst>
+          </p:cNvPr>
+          <p:cNvSpPr/>
+          <p:nvPr/>
+        </p:nvSpPr>
+        <p:spPr>
+          <a:xfrm>
+            <a:off x="4402430" y="4983088"/>
+            <a:ext cx="441434" cy="509087"/>
+          </a:xfrm>
+          <a:prstGeom prst="roundRect">
+            <a:avLst/>
+          </a:prstGeom>
+          <a:solidFill>
+            <a:srgbClr val="00B0F0"/>
+          </a:solidFill>
+          <a:ln w="12700" cap="flat" cmpd="sng" algn="ctr">
+            <a:solidFill>
+              <a:srgbClr val="335FDD"/>
+            </a:solidFill>
+            <a:prstDash val="solid"/>
+            <a:miter lim="800000"/>
+          </a:ln>
+          <a:effectLst/>
+        </p:spPr>
+        <p:txBody>
+          <a:bodyPr rtlCol="0" anchor="ctr"/>
+          <a:lstStyle/>
+          <a:p>
+            <a:pPr marL="0" marR="0" lvl="0" indent="0" algn="ctr" defTabSz="914400" eaLnBrk="1" fontAlgn="auto" latinLnBrk="0" hangingPunct="1">
+              <a:lnSpc>
+                <a:spcPct val="100000"/>
+              </a:lnSpc>
+              <a:spcBef>
+                <a:spcPts val="0"/>
+              </a:spcBef>
+              <a:spcAft>
+                <a:spcPts val="0"/>
+              </a:spcAft>
+              <a:buClrTx/>
+              <a:buSzTx/>
+              <a:buFontTx/>
+              <a:buNone/>
+              <a:tabLst/>
+              <a:defRPr/>
+            </a:pPr>
+            <a:r>
+              <a:rPr kumimoji="0" lang="en-US" sz="1100" b="0" i="0" u="none" strike="noStrike" kern="0" cap="none" spc="0" normalizeH="0" baseline="0" noProof="0" dirty="0">
+                <a:ln>
+                  <a:noFill/>
+                </a:ln>
+                <a:solidFill>
+                  <a:srgbClr val="FFFFFF"/>
+                </a:solidFill>
+                <a:effectLst/>
+                <a:uLnTx/>
+                <a:uFillTx/>
+                <a:latin typeface="Open sans"/>
+                <a:ea typeface="+mn-ea"/>
+                <a:cs typeface="+mn-cs"/>
+              </a:rPr>
+              <a:t>2K</a:t>
+            </a:r>
+          </a:p>
+        </p:txBody>
+      </p:sp>
+      <p:sp>
+        <p:nvSpPr>
+          <p:cNvPr id="58" name="Rounded Rectangle 148">
+            <a:extLst>
+              <a:ext uri="{FF2B5EF4-FFF2-40B4-BE49-F238E27FC236}">
+                <a16:creationId xmlns:a16="http://schemas.microsoft.com/office/drawing/2014/main" id="{81C105B8-B7F4-46A5-82D9-9DA856C43FF9}"/>
+              </a:ext>
+            </a:extLst>
+          </p:cNvPr>
+          <p:cNvSpPr/>
+          <p:nvPr/>
+        </p:nvSpPr>
+        <p:spPr>
+          <a:xfrm>
+            <a:off x="6234745" y="4965345"/>
+            <a:ext cx="441434" cy="509087"/>
+          </a:xfrm>
+          <a:prstGeom prst="roundRect">
+            <a:avLst/>
+          </a:prstGeom>
+          <a:solidFill>
+            <a:srgbClr val="00B0F0"/>
+          </a:solidFill>
+          <a:ln w="12700" cap="flat" cmpd="sng" algn="ctr">
+            <a:solidFill>
+              <a:srgbClr val="335FDD"/>
+            </a:solidFill>
+            <a:prstDash val="solid"/>
+            <a:miter lim="800000"/>
+          </a:ln>
+          <a:effectLst/>
+        </p:spPr>
+        <p:txBody>
+          <a:bodyPr rtlCol="0" anchor="ctr"/>
+          <a:lstStyle/>
+          <a:p>
+            <a:pPr marL="0" marR="0" lvl="0" indent="0" algn="ctr" defTabSz="914400" eaLnBrk="1" fontAlgn="auto" latinLnBrk="0" hangingPunct="1">
+              <a:lnSpc>
+                <a:spcPct val="100000"/>
+              </a:lnSpc>
+              <a:spcBef>
+                <a:spcPts val="0"/>
+              </a:spcBef>
+              <a:spcAft>
+                <a:spcPts val="0"/>
+              </a:spcAft>
+              <a:buClrTx/>
+              <a:buSzTx/>
+              <a:buFontTx/>
+              <a:buNone/>
+              <a:tabLst/>
+              <a:defRPr/>
+            </a:pPr>
+            <a:r>
+              <a:rPr kumimoji="0" lang="en-US" sz="1100" b="0" i="0" u="none" strike="noStrike" kern="0" cap="none" spc="0" normalizeH="0" baseline="0" noProof="0" dirty="0">
+                <a:ln>
+                  <a:noFill/>
+                </a:ln>
+                <a:solidFill>
+                  <a:srgbClr val="FFFFFF"/>
+                </a:solidFill>
+                <a:effectLst/>
+                <a:uLnTx/>
+                <a:uFillTx/>
+                <a:latin typeface="Open sans"/>
+                <a:ea typeface="+mn-ea"/>
+                <a:cs typeface="+mn-cs"/>
+              </a:rPr>
+              <a:t>2K</a:t>
+            </a:r>
+          </a:p>
+        </p:txBody>
+      </p:sp>
+      <p:sp>
+        <p:nvSpPr>
+          <p:cNvPr id="60" name="Cube 59">
+            <a:extLst>
+              <a:ext uri="{FF2B5EF4-FFF2-40B4-BE49-F238E27FC236}">
+                <a16:creationId xmlns:a16="http://schemas.microsoft.com/office/drawing/2014/main" id="{ED8B22A3-9EE7-457C-BC3A-6B6DFB73B8BC}"/>
+              </a:ext>
+            </a:extLst>
+          </p:cNvPr>
+          <p:cNvSpPr/>
+          <p:nvPr/>
+        </p:nvSpPr>
+        <p:spPr>
+          <a:xfrm>
+            <a:off x="6511763" y="3826657"/>
+            <a:ext cx="651641" cy="657081"/>
+          </a:xfrm>
+          <a:prstGeom prst="cube">
+            <a:avLst/>
+          </a:prstGeom>
+          <a:solidFill>
+            <a:srgbClr val="00B050"/>
+          </a:solidFill>
+          <a:ln w="12700" cap="flat" cmpd="sng" algn="ctr">
+            <a:solidFill>
+              <a:srgbClr val="000000"/>
+            </a:solidFill>
+            <a:prstDash val="solid"/>
+            <a:miter lim="800000"/>
+          </a:ln>
+          <a:effectLst/>
+        </p:spPr>
+        <p:txBody>
+          <a:bodyPr rtlCol="0" anchor="ctr"/>
+          <a:lstStyle/>
+          <a:p>
+            <a:pPr marL="0" marR="0" lvl="0" indent="0" algn="ctr" defTabSz="914400" eaLnBrk="1" fontAlgn="auto" latinLnBrk="0" hangingPunct="1">
+              <a:lnSpc>
+                <a:spcPct val="100000"/>
+              </a:lnSpc>
+              <a:spcBef>
+                <a:spcPts val="0"/>
+              </a:spcBef>
+              <a:spcAft>
+                <a:spcPts val="0"/>
+              </a:spcAft>
+              <a:buClrTx/>
+              <a:buSzTx/>
+              <a:buFontTx/>
+              <a:buNone/>
+              <a:tabLst/>
+              <a:defRPr/>
+            </a:pPr>
+            <a:endParaRPr kumimoji="0" lang="en-US" sz="1800" b="0" i="0" u="none" strike="noStrike" kern="0" cap="none" spc="0" normalizeH="0" baseline="0" noProof="0">
+              <a:ln>
+                <a:noFill/>
+              </a:ln>
+              <a:solidFill>
+                <a:srgbClr val="FFFFFF"/>
+              </a:solidFill>
+              <a:effectLst/>
+              <a:uLnTx/>
+              <a:uFillTx/>
+              <a:latin typeface="Open sans"/>
+              <a:ea typeface="+mn-ea"/>
+              <a:cs typeface="+mn-cs"/>
+            </a:endParaRPr>
+          </a:p>
+        </p:txBody>
+      </p:sp>
+      <p:sp>
+        <p:nvSpPr>
+          <p:cNvPr id="61" name="TextBox 60">
+            <a:extLst>
+              <a:ext uri="{FF2B5EF4-FFF2-40B4-BE49-F238E27FC236}">
+                <a16:creationId xmlns:a16="http://schemas.microsoft.com/office/drawing/2014/main" id="{951D6C9C-DCEB-4E1C-925E-8471B1E54789}"/>
+              </a:ext>
+            </a:extLst>
+          </p:cNvPr>
+          <p:cNvSpPr txBox="1"/>
+          <p:nvPr/>
+        </p:nvSpPr>
+        <p:spPr>
+          <a:xfrm>
+            <a:off x="413543" y="418755"/>
+            <a:ext cx="5861131" cy="1077218"/>
+          </a:xfrm>
+          <a:prstGeom prst="rect">
+            <a:avLst/>
+          </a:prstGeom>
+          <a:noFill/>
+        </p:spPr>
+        <p:txBody>
+          <a:bodyPr wrap="square" rtlCol="0">
+            <a:spAutoFit/>
+          </a:bodyPr>
+          <a:lstStyle/>
+          <a:p>
+            <a:r>
+              <a:rPr lang="en-US" sz="1600" b="1" dirty="0">
+                <a:solidFill>
+                  <a:srgbClr val="000000"/>
+                </a:solidFill>
+                <a:latin typeface="Open sans"/>
+              </a:rPr>
+              <a:t>Reserved &amp; Shared Capacity </a:t>
+            </a:r>
+          </a:p>
+          <a:p>
+            <a:r>
+              <a:rPr lang="en-US" sz="1600" dirty="0">
+                <a:solidFill>
+                  <a:srgbClr val="000000"/>
+                </a:solidFill>
+                <a:latin typeface="Open sans"/>
+              </a:rPr>
+              <a:t>- Reserved Capacity for each replica: 2K RU</a:t>
+            </a:r>
+          </a:p>
+          <a:p>
+            <a:r>
+              <a:rPr lang="en-US" sz="1600" dirty="0">
+                <a:solidFill>
+                  <a:srgbClr val="000000"/>
+                </a:solidFill>
+                <a:latin typeface="Open sans"/>
+              </a:rPr>
+              <a:t>- Shared Capacity: 18 partitions * 1K RU each = 18K RU</a:t>
+            </a:r>
+          </a:p>
+          <a:p>
+            <a:r>
+              <a:rPr lang="en-US" sz="1600" dirty="0">
+                <a:solidFill>
+                  <a:srgbClr val="000000"/>
+                </a:solidFill>
+                <a:latin typeface="Open sans"/>
+              </a:rPr>
+              <a:t>Cosmos Capacity: (4 replicas * 2K RU) + 18K RU = 26K RU</a:t>
+            </a:r>
+          </a:p>
+        </p:txBody>
+      </p:sp>
+    </p:spTree>
+    <p:extLst>
+      <p:ext uri="{BB962C8B-B14F-4D97-AF65-F5344CB8AC3E}">
+        <p14:creationId xmlns:p14="http://schemas.microsoft.com/office/powerpoint/2010/main" val="1266737007"/>
+      </p:ext>
+    </p:extLst>
+  </p:cSld>
+  <p:clrMapOvr>
+    <a:masterClrMapping/>
+  </p:clrMapOvr>
+</p:sld>
+</file>
+
 <file path=ppt/theme/theme1.xml><?xml version="1.0" encoding="utf-8"?>
 <a:theme xmlns:a="http://schemas.openxmlformats.org/drawingml/2006/main" name="Office Theme">
   <a:themeElements>
@@ -5730,4 +9063,10 @@
     </a:ext>
   </a:extLst>
 </a:theme>
+</file>
+
+<file path=docMetadata/LabelInfo.xml><?xml version="1.0" encoding="utf-8"?>
+<clbl:labelList xmlns:clbl="http://schemas.microsoft.com/office/2020/mipLabelMetadata">
+  <clbl:label id="{f42aa342-8706-4288-bd11-ebb85995028c}" enabled="1" method="Standard" siteId="{72f988bf-86f1-41af-91ab-2d7cd011db47}" contentBits="0" removed="0"/>
+</clbl:labelList>
 </file>
</xml_diff>